<commit_message>
fix plots and other fixes
</commit_message>
<xml_diff>
--- a/Исследование алгоритма вычисления ионосферной поправки для системы Galileo.pptx
+++ b/Исследование алгоритма вычисления ионосферной поправки для системы Galileo.pptx
@@ -8,19 +8,17 @@
     <p:sldId id="256" r:id="rId2"/>
     <p:sldId id="265" r:id="rId3"/>
     <p:sldId id="266" r:id="rId4"/>
-    <p:sldId id="257" r:id="rId5"/>
-    <p:sldId id="258" r:id="rId6"/>
-    <p:sldId id="259" r:id="rId7"/>
-    <p:sldId id="260" r:id="rId8"/>
-    <p:sldId id="261" r:id="rId9"/>
-    <p:sldId id="262" r:id="rId10"/>
-    <p:sldId id="270" r:id="rId11"/>
-    <p:sldId id="269" r:id="rId12"/>
-    <p:sldId id="268" r:id="rId13"/>
-    <p:sldId id="263" r:id="rId14"/>
-    <p:sldId id="267" r:id="rId15"/>
-    <p:sldId id="271" r:id="rId16"/>
-    <p:sldId id="264" r:id="rId17"/>
+    <p:sldId id="259" r:id="rId5"/>
+    <p:sldId id="262" r:id="rId6"/>
+    <p:sldId id="270" r:id="rId7"/>
+    <p:sldId id="268" r:id="rId8"/>
+    <p:sldId id="263" r:id="rId9"/>
+    <p:sldId id="267" r:id="rId10"/>
+    <p:sldId id="271" r:id="rId11"/>
+    <p:sldId id="274" r:id="rId12"/>
+    <p:sldId id="273" r:id="rId13"/>
+    <p:sldId id="272" r:id="rId14"/>
+    <p:sldId id="264" r:id="rId15"/>
   </p:sldIdLst>
   <p:sldSz cx="12192000" cy="6858000"/>
   <p:notesSz cx="6858000" cy="9144000"/>
@@ -3357,11 +3355,34 @@
             <p:ph type="ctrTitle"/>
           </p:nvPr>
         </p:nvSpPr>
-        <p:spPr/>
-        <p:txBody>
-          <a:bodyPr/>
-          <a:lstStyle/>
-          <a:p>
+        <p:spPr>
+          <a:xfrm>
+            <a:off x="1524000" y="2092569"/>
+            <a:ext cx="9144000" cy="1417394"/>
+          </a:xfrm>
+        </p:spPr>
+        <p:txBody>
+          <a:bodyPr>
+            <a:normAutofit fontScale="90000"/>
+          </a:bodyPr>
+          <a:lstStyle/>
+          <a:p>
+            <a:br>
+              <a:rPr lang="en-US" sz="2800" dirty="0">
+                <a:effectLst/>
+                <a:latin typeface="Times New Roman" panose="02020603050405020304" pitchFamily="18" charset="0"/>
+                <a:ea typeface="Calibri" panose="020F0502020204030204" pitchFamily="34" charset="0"/>
+                <a:cs typeface="Times New Roman" panose="02020603050405020304" pitchFamily="18" charset="0"/>
+              </a:rPr>
+            </a:br>
+            <a:br>
+              <a:rPr lang="en-US" sz="2800" dirty="0">
+                <a:effectLst/>
+                <a:latin typeface="Times New Roman" panose="02020603050405020304" pitchFamily="18" charset="0"/>
+                <a:ea typeface="Calibri" panose="020F0502020204030204" pitchFamily="34" charset="0"/>
+                <a:cs typeface="Times New Roman" panose="02020603050405020304" pitchFamily="18" charset="0"/>
+              </a:rPr>
+            </a:br>
             <a:r>
               <a:rPr lang="ru-RU" sz="2800" dirty="0">
                 <a:effectLst/>
@@ -3369,34 +3390,24 @@
                 <a:ea typeface="Calibri" panose="020F0502020204030204" pitchFamily="34" charset="0"/>
                 <a:cs typeface="Times New Roman" panose="02020603050405020304" pitchFamily="18" charset="0"/>
               </a:rPr>
-              <a:t>Исследование алгоритма вычисления ионосферной поправки для системы </a:t>
-            </a:r>
-            <a:r>
-              <a:rPr lang="ru-RU" sz="2800" dirty="0" err="1">
-                <a:effectLst/>
-                <a:latin typeface="Times New Roman" panose="02020603050405020304" pitchFamily="18" charset="0"/>
-                <a:ea typeface="Calibri" panose="020F0502020204030204" pitchFamily="34" charset="0"/>
-                <a:cs typeface="Times New Roman" panose="02020603050405020304" pitchFamily="18" charset="0"/>
-              </a:rPr>
-              <a:t>Galileo</a:t>
-            </a:r>
-            <a:r>
+              <a:t>ДИПЛОМНАЯ РАБОТА</a:t>
+            </a:r>
+            <a:br>
               <a:rPr lang="ru-RU" sz="2800" dirty="0">
                 <a:effectLst/>
                 <a:latin typeface="Times New Roman" panose="02020603050405020304" pitchFamily="18" charset="0"/>
                 <a:ea typeface="Calibri" panose="020F0502020204030204" pitchFamily="34" charset="0"/>
                 <a:cs typeface="Times New Roman" panose="02020603050405020304" pitchFamily="18" charset="0"/>
               </a:rPr>
-              <a:t>.</a:t>
-            </a:r>
-            <a:r>
-              <a:rPr lang="ru-RU" sz="1800" dirty="0">
+            </a:br>
+            <a:r>
+              <a:rPr lang="ru-RU" sz="2800" dirty="0">
                 <a:effectLst/>
                 <a:latin typeface="Times New Roman" panose="02020603050405020304" pitchFamily="18" charset="0"/>
                 <a:ea typeface="Calibri" panose="020F0502020204030204" pitchFamily="34" charset="0"/>
                 <a:cs typeface="Times New Roman" panose="02020603050405020304" pitchFamily="18" charset="0"/>
               </a:rPr>
-              <a:t> </a:t>
+              <a:t>Исследование алгоритма вычисления ионосферной поправки для системы Galileo</a:t>
             </a:r>
             <a:br>
               <a:rPr lang="ru-RU" sz="1800" dirty="0">
@@ -3426,15 +3437,85 @@
             <p:ph type="subTitle" idx="1"/>
           </p:nvPr>
         </p:nvSpPr>
-        <p:spPr/>
-        <p:txBody>
-          <a:bodyPr/>
-          <a:lstStyle/>
-          <a:p>
-            <a:r>
-              <a:rPr lang="ru-RU" dirty="0"/>
-              <a:t>Сюлин Н. Г. РФ18-32Б</a:t>
-            </a:r>
+        <p:spPr>
+          <a:xfrm>
+            <a:off x="1524000" y="3602038"/>
+            <a:ext cx="9144000" cy="2904270"/>
+          </a:xfrm>
+        </p:spPr>
+        <p:txBody>
+          <a:bodyPr/>
+          <a:lstStyle/>
+          <a:p>
+            <a:pPr algn="just"/>
+            <a:r>
+              <a:rPr lang="ru-RU" dirty="0">
+                <a:latin typeface="Times New Roman" panose="02020603050405020304" pitchFamily="18" charset="0"/>
+                <a:cs typeface="Times New Roman" panose="02020603050405020304" pitchFamily="18" charset="0"/>
+              </a:rPr>
+              <a:t>Выполнил: Сюлин Никита Геннадьевич</a:t>
+            </a:r>
+          </a:p>
+          <a:p>
+            <a:pPr algn="just"/>
+            <a:endParaRPr lang="ru-RU" dirty="0">
+              <a:latin typeface="Times New Roman" panose="02020603050405020304" pitchFamily="18" charset="0"/>
+              <a:cs typeface="Times New Roman" panose="02020603050405020304" pitchFamily="18" charset="0"/>
+            </a:endParaRPr>
+          </a:p>
+          <a:p>
+            <a:pPr algn="just"/>
+            <a:r>
+              <a:rPr lang="ru-RU" dirty="0">
+                <a:latin typeface="Times New Roman" panose="02020603050405020304" pitchFamily="18" charset="0"/>
+                <a:cs typeface="Times New Roman" panose="02020603050405020304" pitchFamily="18" charset="0"/>
+              </a:rPr>
+              <a:t>Проверил: Валиханов Марат Музагитович</a:t>
+            </a:r>
+          </a:p>
+          <a:p>
+            <a:pPr algn="just"/>
+            <a:endParaRPr lang="ru-RU" dirty="0">
+              <a:latin typeface="Times New Roman" panose="02020603050405020304" pitchFamily="18" charset="0"/>
+              <a:cs typeface="Times New Roman" panose="02020603050405020304" pitchFamily="18" charset="0"/>
+            </a:endParaRPr>
+          </a:p>
+          <a:p>
+            <a:pPr algn="just"/>
+            <a:endParaRPr lang="ru-RU" dirty="0">
+              <a:latin typeface="Times New Roman" panose="02020603050405020304" pitchFamily="18" charset="0"/>
+              <a:cs typeface="Times New Roman" panose="02020603050405020304" pitchFamily="18" charset="0"/>
+            </a:endParaRPr>
+          </a:p>
+          <a:p>
+            <a:r>
+              <a:rPr lang="ru-RU" dirty="0">
+                <a:latin typeface="Times New Roman" panose="02020603050405020304" pitchFamily="18" charset="0"/>
+                <a:cs typeface="Times New Roman" panose="02020603050405020304" pitchFamily="18" charset="0"/>
+              </a:rPr>
+              <a:t>Красноярск 2022</a:t>
+            </a:r>
+          </a:p>
+          <a:p>
+            <a:pPr algn="just"/>
+            <a:endParaRPr lang="ru-RU" dirty="0">
+              <a:latin typeface="Times New Roman" panose="02020603050405020304" pitchFamily="18" charset="0"/>
+              <a:cs typeface="Times New Roman" panose="02020603050405020304" pitchFamily="18" charset="0"/>
+            </a:endParaRPr>
+          </a:p>
+          <a:p>
+            <a:pPr algn="just"/>
+            <a:endParaRPr lang="ru-RU" dirty="0">
+              <a:latin typeface="Times New Roman" panose="02020603050405020304" pitchFamily="18" charset="0"/>
+              <a:cs typeface="Times New Roman" panose="02020603050405020304" pitchFamily="18" charset="0"/>
+            </a:endParaRPr>
+          </a:p>
+          <a:p>
+            <a:pPr algn="just"/>
+            <a:endParaRPr lang="ru-RU" dirty="0">
+              <a:latin typeface="Times New Roman" panose="02020603050405020304" pitchFamily="18" charset="0"/>
+              <a:cs typeface="Times New Roman" panose="02020603050405020304" pitchFamily="18" charset="0"/>
+            </a:endParaRPr>
           </a:p>
         </p:txBody>
       </p:sp>
@@ -3468,6 +3549,1035 @@
           <a:chExt cx="0" cy="0"/>
         </a:xfrm>
       </p:grpSpPr>
+      <p:pic>
+        <p:nvPicPr>
+          <p:cNvPr id="10" name="Рисунок 9">
+            <a:extLst>
+              <a:ext uri="{FF2B5EF4-FFF2-40B4-BE49-F238E27FC236}">
+                <a16:creationId xmlns:a16="http://schemas.microsoft.com/office/drawing/2014/main" id="{BC3F6882-A2B6-509A-EADA-7C58BA5FA3DE}"/>
+              </a:ext>
+            </a:extLst>
+          </p:cNvPr>
+          <p:cNvPicPr>
+            <a:picLocks noChangeAspect="1"/>
+          </p:cNvPicPr>
+          <p:nvPr/>
+        </p:nvPicPr>
+        <p:blipFill rotWithShape="1">
+          <a:blip r:embed="rId2">
+            <a:extLst>
+              <a:ext uri="{28A0092B-C50C-407E-A947-70E740481C1C}">
+                <a14:useLocalDpi xmlns:a14="http://schemas.microsoft.com/office/drawing/2010/main" val="0"/>
+              </a:ext>
+            </a:extLst>
+          </a:blip>
+          <a:srcRect l="8962" t="11095" r="9610" b="4797"/>
+          <a:stretch/>
+        </p:blipFill>
+        <p:spPr>
+          <a:xfrm>
+            <a:off x="1472711" y="1690688"/>
+            <a:ext cx="9246577" cy="4800256"/>
+          </a:xfrm>
+          <a:prstGeom prst="rect">
+            <a:avLst/>
+          </a:prstGeom>
+        </p:spPr>
+      </p:pic>
+      <p:sp>
+        <p:nvSpPr>
+          <p:cNvPr id="11" name="Заголовок 10">
+            <a:extLst>
+              <a:ext uri="{FF2B5EF4-FFF2-40B4-BE49-F238E27FC236}">
+                <a16:creationId xmlns:a16="http://schemas.microsoft.com/office/drawing/2014/main" id="{362C2344-CDCA-AB75-EAD7-E0B6F2E0D482}"/>
+              </a:ext>
+            </a:extLst>
+          </p:cNvPr>
+          <p:cNvSpPr>
+            <a:spLocks noGrp="1"/>
+          </p:cNvSpPr>
+          <p:nvPr>
+            <p:ph type="title"/>
+          </p:nvPr>
+        </p:nvSpPr>
+        <p:spPr/>
+        <p:txBody>
+          <a:bodyPr/>
+          <a:lstStyle/>
+          <a:p>
+            <a:r>
+              <a:rPr lang="ru-RU" dirty="0"/>
+              <a:t>Анализ результатов</a:t>
+            </a:r>
+          </a:p>
+        </p:txBody>
+      </p:sp>
+    </p:spTree>
+    <p:extLst>
+      <p:ext uri="{BB962C8B-B14F-4D97-AF65-F5344CB8AC3E}">
+        <p14:creationId xmlns:p14="http://schemas.microsoft.com/office/powerpoint/2010/main" val="1770701558"/>
+      </p:ext>
+    </p:extLst>
+  </p:cSld>
+  <p:clrMapOvr>
+    <a:masterClrMapping/>
+  </p:clrMapOvr>
+</p:sld>
+</file>
+
+<file path=ppt/slides/slide11.xml><?xml version="1.0" encoding="utf-8"?>
+<p:sld xmlns:a="http://schemas.openxmlformats.org/drawingml/2006/main" xmlns:r="http://schemas.openxmlformats.org/officeDocument/2006/relationships" xmlns:p="http://schemas.openxmlformats.org/presentationml/2006/main">
+  <p:cSld>
+    <p:spTree>
+      <p:nvGrpSpPr>
+        <p:cNvPr id="1" name=""/>
+        <p:cNvGrpSpPr/>
+        <p:nvPr/>
+      </p:nvGrpSpPr>
+      <p:grpSpPr>
+        <a:xfrm>
+          <a:off x="0" y="0"/>
+          <a:ext cx="0" cy="0"/>
+          <a:chOff x="0" y="0"/>
+          <a:chExt cx="0" cy="0"/>
+        </a:xfrm>
+      </p:grpSpPr>
+      <p:sp>
+        <p:nvSpPr>
+          <p:cNvPr id="2" name="Заголовок 1">
+            <a:extLst>
+              <a:ext uri="{FF2B5EF4-FFF2-40B4-BE49-F238E27FC236}">
+                <a16:creationId xmlns:a16="http://schemas.microsoft.com/office/drawing/2014/main" id="{6CB49176-F9B2-0458-5749-B852FD4DB2A6}"/>
+              </a:ext>
+            </a:extLst>
+          </p:cNvPr>
+          <p:cNvSpPr>
+            <a:spLocks noGrp="1"/>
+          </p:cNvSpPr>
+          <p:nvPr>
+            <p:ph type="title"/>
+          </p:nvPr>
+        </p:nvSpPr>
+        <p:spPr/>
+        <p:txBody>
+          <a:bodyPr/>
+          <a:lstStyle/>
+          <a:p>
+            <a:r>
+              <a:rPr lang="ru-RU" dirty="0"/>
+              <a:t>Анализ результатов</a:t>
+            </a:r>
+          </a:p>
+        </p:txBody>
+      </p:sp>
+      <p:pic>
+        <p:nvPicPr>
+          <p:cNvPr id="4" name="Рисунок 3">
+            <a:extLst>
+              <a:ext uri="{FF2B5EF4-FFF2-40B4-BE49-F238E27FC236}">
+                <a16:creationId xmlns:a16="http://schemas.microsoft.com/office/drawing/2014/main" id="{12E91519-C22D-8CD7-76E5-E3A8297FC018}"/>
+              </a:ext>
+            </a:extLst>
+          </p:cNvPr>
+          <p:cNvPicPr>
+            <a:picLocks noChangeAspect="1"/>
+          </p:cNvPicPr>
+          <p:nvPr/>
+        </p:nvPicPr>
+        <p:blipFill rotWithShape="1">
+          <a:blip r:embed="rId2">
+            <a:extLst>
+              <a:ext uri="{28A0092B-C50C-407E-A947-70E740481C1C}">
+                <a14:useLocalDpi xmlns:a14="http://schemas.microsoft.com/office/drawing/2010/main" val="0"/>
+              </a:ext>
+            </a:extLst>
+          </a:blip>
+          <a:srcRect l="7514" t="8579" r="7797" b="3772"/>
+          <a:stretch/>
+        </p:blipFill>
+        <p:spPr>
+          <a:xfrm>
+            <a:off x="1495353" y="1690688"/>
+            <a:ext cx="9201294" cy="4786157"/>
+          </a:xfrm>
+          <a:prstGeom prst="rect">
+            <a:avLst/>
+          </a:prstGeom>
+        </p:spPr>
+      </p:pic>
+    </p:spTree>
+    <p:extLst>
+      <p:ext uri="{BB962C8B-B14F-4D97-AF65-F5344CB8AC3E}">
+        <p14:creationId xmlns:p14="http://schemas.microsoft.com/office/powerpoint/2010/main" val="2679187164"/>
+      </p:ext>
+    </p:extLst>
+  </p:cSld>
+  <p:clrMapOvr>
+    <a:masterClrMapping/>
+  </p:clrMapOvr>
+</p:sld>
+</file>
+
+<file path=ppt/slides/slide12.xml><?xml version="1.0" encoding="utf-8"?>
+<p:sld xmlns:a="http://schemas.openxmlformats.org/drawingml/2006/main" xmlns:r="http://schemas.openxmlformats.org/officeDocument/2006/relationships" xmlns:p="http://schemas.openxmlformats.org/presentationml/2006/main">
+  <p:cSld>
+    <p:spTree>
+      <p:nvGrpSpPr>
+        <p:cNvPr id="1" name=""/>
+        <p:cNvGrpSpPr/>
+        <p:nvPr/>
+      </p:nvGrpSpPr>
+      <p:grpSpPr>
+        <a:xfrm>
+          <a:off x="0" y="0"/>
+          <a:ext cx="0" cy="0"/>
+          <a:chOff x="0" y="0"/>
+          <a:chExt cx="0" cy="0"/>
+        </a:xfrm>
+      </p:grpSpPr>
+      <p:sp>
+        <p:nvSpPr>
+          <p:cNvPr id="2" name="Заголовок 1">
+            <a:extLst>
+              <a:ext uri="{FF2B5EF4-FFF2-40B4-BE49-F238E27FC236}">
+                <a16:creationId xmlns:a16="http://schemas.microsoft.com/office/drawing/2014/main" id="{564182AC-499B-0B4C-E0A8-0493F76EFC25}"/>
+              </a:ext>
+            </a:extLst>
+          </p:cNvPr>
+          <p:cNvSpPr>
+            <a:spLocks noGrp="1"/>
+          </p:cNvSpPr>
+          <p:nvPr>
+            <p:ph type="title"/>
+          </p:nvPr>
+        </p:nvSpPr>
+        <p:spPr/>
+        <p:txBody>
+          <a:bodyPr/>
+          <a:lstStyle/>
+          <a:p>
+            <a:r>
+              <a:rPr lang="ru-RU" dirty="0"/>
+              <a:t>Анализ результатов</a:t>
+            </a:r>
+          </a:p>
+        </p:txBody>
+      </p:sp>
+      <p:pic>
+        <p:nvPicPr>
+          <p:cNvPr id="4" name="Объект 4">
+            <a:extLst>
+              <a:ext uri="{FF2B5EF4-FFF2-40B4-BE49-F238E27FC236}">
+                <a16:creationId xmlns:a16="http://schemas.microsoft.com/office/drawing/2014/main" id="{D0DDF642-1BC6-DF52-C62D-AA295F75669B}"/>
+              </a:ext>
+            </a:extLst>
+          </p:cNvPr>
+          <p:cNvPicPr>
+            <a:picLocks noGrp="1" noChangeAspect="1"/>
+          </p:cNvPicPr>
+          <p:nvPr>
+            <p:ph idx="1"/>
+          </p:nvPr>
+        </p:nvPicPr>
+        <p:blipFill rotWithShape="1">
+          <a:blip r:embed="rId2">
+            <a:extLst>
+              <a:ext uri="{28A0092B-C50C-407E-A947-70E740481C1C}">
+                <a14:useLocalDpi xmlns:a14="http://schemas.microsoft.com/office/drawing/2010/main" val="0"/>
+              </a:ext>
+            </a:extLst>
+          </a:blip>
+          <a:srcRect l="8922" t="8843" r="8783" b="2860"/>
+          <a:stretch/>
+        </p:blipFill>
+        <p:spPr>
+          <a:xfrm>
+            <a:off x="1551842" y="1690688"/>
+            <a:ext cx="9088315" cy="4901027"/>
+          </a:xfrm>
+        </p:spPr>
+      </p:pic>
+    </p:spTree>
+    <p:extLst>
+      <p:ext uri="{BB962C8B-B14F-4D97-AF65-F5344CB8AC3E}">
+        <p14:creationId xmlns:p14="http://schemas.microsoft.com/office/powerpoint/2010/main" val="452733803"/>
+      </p:ext>
+    </p:extLst>
+  </p:cSld>
+  <p:clrMapOvr>
+    <a:masterClrMapping/>
+  </p:clrMapOvr>
+</p:sld>
+</file>
+
+<file path=ppt/slides/slide13.xml><?xml version="1.0" encoding="utf-8"?>
+<p:sld xmlns:a="http://schemas.openxmlformats.org/drawingml/2006/main" xmlns:r="http://schemas.openxmlformats.org/officeDocument/2006/relationships" xmlns:p="http://schemas.openxmlformats.org/presentationml/2006/main">
+  <p:cSld>
+    <p:spTree>
+      <p:nvGrpSpPr>
+        <p:cNvPr id="1" name=""/>
+        <p:cNvGrpSpPr/>
+        <p:nvPr/>
+      </p:nvGrpSpPr>
+      <p:grpSpPr>
+        <a:xfrm>
+          <a:off x="0" y="0"/>
+          <a:ext cx="0" cy="0"/>
+          <a:chOff x="0" y="0"/>
+          <a:chExt cx="0" cy="0"/>
+        </a:xfrm>
+      </p:grpSpPr>
+      <p:sp>
+        <p:nvSpPr>
+          <p:cNvPr id="2" name="Заголовок 1">
+            <a:extLst>
+              <a:ext uri="{FF2B5EF4-FFF2-40B4-BE49-F238E27FC236}">
+                <a16:creationId xmlns:a16="http://schemas.microsoft.com/office/drawing/2014/main" id="{487B5E6D-720A-04ED-82C1-0BA8F356495A}"/>
+              </a:ext>
+            </a:extLst>
+          </p:cNvPr>
+          <p:cNvSpPr>
+            <a:spLocks noGrp="1"/>
+          </p:cNvSpPr>
+          <p:nvPr>
+            <p:ph type="title"/>
+          </p:nvPr>
+        </p:nvSpPr>
+        <p:spPr/>
+        <p:txBody>
+          <a:bodyPr/>
+          <a:lstStyle/>
+          <a:p>
+            <a:r>
+              <a:rPr lang="ru-RU" dirty="0"/>
+              <a:t>Анализ результатов</a:t>
+            </a:r>
+          </a:p>
+        </p:txBody>
+      </p:sp>
+      <p:pic>
+        <p:nvPicPr>
+          <p:cNvPr id="4" name="Рисунок 3">
+            <a:extLst>
+              <a:ext uri="{FF2B5EF4-FFF2-40B4-BE49-F238E27FC236}">
+                <a16:creationId xmlns:a16="http://schemas.microsoft.com/office/drawing/2014/main" id="{528ABEDB-3DB6-337A-D23D-2782D0BF233A}"/>
+              </a:ext>
+            </a:extLst>
+          </p:cNvPr>
+          <p:cNvPicPr>
+            <a:picLocks noChangeAspect="1"/>
+          </p:cNvPicPr>
+          <p:nvPr/>
+        </p:nvPicPr>
+        <p:blipFill rotWithShape="1">
+          <a:blip r:embed="rId2">
+            <a:extLst>
+              <a:ext uri="{28A0092B-C50C-407E-A947-70E740481C1C}">
+                <a14:useLocalDpi xmlns:a14="http://schemas.microsoft.com/office/drawing/2010/main" val="0"/>
+              </a:ext>
+            </a:extLst>
+          </a:blip>
+          <a:srcRect l="9058" t="10708" r="9611" b="4797"/>
+          <a:stretch/>
+        </p:blipFill>
+        <p:spPr>
+          <a:xfrm>
+            <a:off x="1736481" y="1940179"/>
+            <a:ext cx="8719038" cy="4552696"/>
+          </a:xfrm>
+          <a:prstGeom prst="rect">
+            <a:avLst/>
+          </a:prstGeom>
+        </p:spPr>
+      </p:pic>
+    </p:spTree>
+    <p:extLst>
+      <p:ext uri="{BB962C8B-B14F-4D97-AF65-F5344CB8AC3E}">
+        <p14:creationId xmlns:p14="http://schemas.microsoft.com/office/powerpoint/2010/main" val="715348722"/>
+      </p:ext>
+    </p:extLst>
+  </p:cSld>
+  <p:clrMapOvr>
+    <a:masterClrMapping/>
+  </p:clrMapOvr>
+</p:sld>
+</file>
+
+<file path=ppt/slides/slide14.xml><?xml version="1.0" encoding="utf-8"?>
+<p:sld xmlns:a="http://schemas.openxmlformats.org/drawingml/2006/main" xmlns:r="http://schemas.openxmlformats.org/officeDocument/2006/relationships" xmlns:p="http://schemas.openxmlformats.org/presentationml/2006/main">
+  <p:cSld>
+    <p:spTree>
+      <p:nvGrpSpPr>
+        <p:cNvPr id="1" name=""/>
+        <p:cNvGrpSpPr/>
+        <p:nvPr/>
+      </p:nvGrpSpPr>
+      <p:grpSpPr>
+        <a:xfrm>
+          <a:off x="0" y="0"/>
+          <a:ext cx="0" cy="0"/>
+          <a:chOff x="0" y="0"/>
+          <a:chExt cx="0" cy="0"/>
+        </a:xfrm>
+      </p:grpSpPr>
+      <p:sp>
+        <p:nvSpPr>
+          <p:cNvPr id="2" name="Заголовок 1">
+            <a:extLst>
+              <a:ext uri="{FF2B5EF4-FFF2-40B4-BE49-F238E27FC236}">
+                <a16:creationId xmlns:a16="http://schemas.microsoft.com/office/drawing/2014/main" id="{B22F2EAC-507F-84EE-7B08-EDD258EBC1D5}"/>
+              </a:ext>
+            </a:extLst>
+          </p:cNvPr>
+          <p:cNvSpPr>
+            <a:spLocks noGrp="1"/>
+          </p:cNvSpPr>
+          <p:nvPr>
+            <p:ph type="title"/>
+          </p:nvPr>
+        </p:nvSpPr>
+        <p:spPr>
+          <a:xfrm>
+            <a:off x="838200" y="2766218"/>
+            <a:ext cx="10515600" cy="1325563"/>
+          </a:xfrm>
+        </p:spPr>
+        <p:txBody>
+          <a:bodyPr/>
+          <a:lstStyle/>
+          <a:p>
+            <a:pPr algn="ctr"/>
+            <a:r>
+              <a:rPr lang="ru-RU" dirty="0"/>
+              <a:t>Спасибо за внимание</a:t>
+            </a:r>
+          </a:p>
+        </p:txBody>
+      </p:sp>
+    </p:spTree>
+    <p:extLst>
+      <p:ext uri="{BB962C8B-B14F-4D97-AF65-F5344CB8AC3E}">
+        <p14:creationId xmlns:p14="http://schemas.microsoft.com/office/powerpoint/2010/main" val="2695260135"/>
+      </p:ext>
+    </p:extLst>
+  </p:cSld>
+  <p:clrMapOvr>
+    <a:masterClrMapping/>
+  </p:clrMapOvr>
+</p:sld>
+</file>
+
+<file path=ppt/slides/slide2.xml><?xml version="1.0" encoding="utf-8"?>
+<p:sld xmlns:a="http://schemas.openxmlformats.org/drawingml/2006/main" xmlns:r="http://schemas.openxmlformats.org/officeDocument/2006/relationships" xmlns:p="http://schemas.openxmlformats.org/presentationml/2006/main">
+  <p:cSld>
+    <p:spTree>
+      <p:nvGrpSpPr>
+        <p:cNvPr id="1" name=""/>
+        <p:cNvGrpSpPr/>
+        <p:nvPr/>
+      </p:nvGrpSpPr>
+      <p:grpSpPr>
+        <a:xfrm>
+          <a:off x="0" y="0"/>
+          <a:ext cx="0" cy="0"/>
+          <a:chOff x="0" y="0"/>
+          <a:chExt cx="0" cy="0"/>
+        </a:xfrm>
+      </p:grpSpPr>
+      <p:sp>
+        <p:nvSpPr>
+          <p:cNvPr id="2" name="Заголовок 1">
+            <a:extLst>
+              <a:ext uri="{FF2B5EF4-FFF2-40B4-BE49-F238E27FC236}">
+                <a16:creationId xmlns:a16="http://schemas.microsoft.com/office/drawing/2014/main" id="{1D31D0D2-E06E-C28F-5933-AEC8D0E5D080}"/>
+              </a:ext>
+            </a:extLst>
+          </p:cNvPr>
+          <p:cNvSpPr>
+            <a:spLocks noGrp="1"/>
+          </p:cNvSpPr>
+          <p:nvPr>
+            <p:ph type="title"/>
+          </p:nvPr>
+        </p:nvSpPr>
+        <p:spPr/>
+        <p:txBody>
+          <a:bodyPr/>
+          <a:lstStyle/>
+          <a:p>
+            <a:r>
+              <a:rPr lang="ru-RU" dirty="0"/>
+              <a:t>Актуальность</a:t>
+            </a:r>
+          </a:p>
+        </p:txBody>
+      </p:sp>
+      <p:pic>
+        <p:nvPicPr>
+          <p:cNvPr id="5" name="Рисунок 4">
+            <a:extLst>
+              <a:ext uri="{FF2B5EF4-FFF2-40B4-BE49-F238E27FC236}">
+                <a16:creationId xmlns:a16="http://schemas.microsoft.com/office/drawing/2014/main" id="{6357902A-7508-C6C0-4F5D-FFA62238FFB0}"/>
+              </a:ext>
+            </a:extLst>
+          </p:cNvPr>
+          <p:cNvPicPr>
+            <a:picLocks noChangeAspect="1"/>
+          </p:cNvPicPr>
+          <p:nvPr/>
+        </p:nvPicPr>
+        <p:blipFill>
+          <a:blip r:embed="rId2">
+            <a:extLst>
+              <a:ext uri="{28A0092B-C50C-407E-A947-70E740481C1C}">
+                <a14:useLocalDpi xmlns:a14="http://schemas.microsoft.com/office/drawing/2010/main" val="0"/>
+              </a:ext>
+            </a:extLst>
+          </a:blip>
+          <a:stretch>
+            <a:fillRect/>
+          </a:stretch>
+        </p:blipFill>
+        <p:spPr>
+          <a:xfrm>
+            <a:off x="2504342" y="1425411"/>
+            <a:ext cx="7183315" cy="5067464"/>
+          </a:xfrm>
+          <a:prstGeom prst="rect">
+            <a:avLst/>
+          </a:prstGeom>
+        </p:spPr>
+      </p:pic>
+    </p:spTree>
+    <p:extLst>
+      <p:ext uri="{BB962C8B-B14F-4D97-AF65-F5344CB8AC3E}">
+        <p14:creationId xmlns:p14="http://schemas.microsoft.com/office/powerpoint/2010/main" val="4042108325"/>
+      </p:ext>
+    </p:extLst>
+  </p:cSld>
+  <p:clrMapOvr>
+    <a:masterClrMapping/>
+  </p:clrMapOvr>
+</p:sld>
+</file>
+
+<file path=ppt/slides/slide3.xml><?xml version="1.0" encoding="utf-8"?>
+<p:sld xmlns:a="http://schemas.openxmlformats.org/drawingml/2006/main" xmlns:r="http://schemas.openxmlformats.org/officeDocument/2006/relationships" xmlns:p="http://schemas.openxmlformats.org/presentationml/2006/main">
+  <p:cSld>
+    <p:spTree>
+      <p:nvGrpSpPr>
+        <p:cNvPr id="1" name=""/>
+        <p:cNvGrpSpPr/>
+        <p:nvPr/>
+      </p:nvGrpSpPr>
+      <p:grpSpPr>
+        <a:xfrm>
+          <a:off x="0" y="0"/>
+          <a:ext cx="0" cy="0"/>
+          <a:chOff x="0" y="0"/>
+          <a:chExt cx="0" cy="0"/>
+        </a:xfrm>
+      </p:grpSpPr>
+      <p:sp>
+        <p:nvSpPr>
+          <p:cNvPr id="2" name="Заголовок 1">
+            <a:extLst>
+              <a:ext uri="{FF2B5EF4-FFF2-40B4-BE49-F238E27FC236}">
+                <a16:creationId xmlns:a16="http://schemas.microsoft.com/office/drawing/2014/main" id="{49E7EB47-3F06-7A5E-0B73-9A8CEC8D88A0}"/>
+              </a:ext>
+            </a:extLst>
+          </p:cNvPr>
+          <p:cNvSpPr>
+            <a:spLocks noGrp="1"/>
+          </p:cNvSpPr>
+          <p:nvPr>
+            <p:ph type="title"/>
+          </p:nvPr>
+        </p:nvSpPr>
+        <p:spPr/>
+        <p:txBody>
+          <a:bodyPr/>
+          <a:lstStyle/>
+          <a:p>
+            <a:r>
+              <a:rPr lang="ru-RU" dirty="0"/>
+              <a:t>Цель – Исследование модели </a:t>
+            </a:r>
+            <a:r>
+              <a:rPr lang="en-US" dirty="0" err="1"/>
+              <a:t>NeQuick</a:t>
+            </a:r>
+            <a:endParaRPr lang="ru-RU" dirty="0"/>
+          </a:p>
+        </p:txBody>
+      </p:sp>
+      <p:sp>
+        <p:nvSpPr>
+          <p:cNvPr id="3" name="Объект 2">
+            <a:extLst>
+              <a:ext uri="{FF2B5EF4-FFF2-40B4-BE49-F238E27FC236}">
+                <a16:creationId xmlns:a16="http://schemas.microsoft.com/office/drawing/2014/main" id="{E4379BAC-0C57-956D-1016-E6628C2EE48B}"/>
+              </a:ext>
+            </a:extLst>
+          </p:cNvPr>
+          <p:cNvSpPr>
+            <a:spLocks noGrp="1"/>
+          </p:cNvSpPr>
+          <p:nvPr>
+            <p:ph idx="1"/>
+          </p:nvPr>
+        </p:nvSpPr>
+        <p:spPr>
+          <a:xfrm>
+            <a:off x="838200" y="1555140"/>
+            <a:ext cx="10515600" cy="4858117"/>
+          </a:xfrm>
+        </p:spPr>
+        <p:txBody>
+          <a:bodyPr/>
+          <a:lstStyle/>
+          <a:p>
+            <a:pPr marL="0" indent="0">
+              <a:buNone/>
+            </a:pPr>
+            <a:r>
+              <a:rPr lang="ru-RU" dirty="0">
+                <a:latin typeface="Times New Roman" panose="02020603050405020304" pitchFamily="18" charset="0"/>
+                <a:cs typeface="Times New Roman" panose="02020603050405020304" pitchFamily="18" charset="0"/>
+              </a:rPr>
+              <a:t>Задачи:</a:t>
+            </a:r>
+          </a:p>
+          <a:p>
+            <a:r>
+              <a:rPr lang="ru-RU" dirty="0">
+                <a:latin typeface="Times New Roman" panose="02020603050405020304" pitchFamily="18" charset="0"/>
+                <a:cs typeface="Times New Roman" panose="02020603050405020304" pitchFamily="18" charset="0"/>
+              </a:rPr>
+              <a:t>С помощью алгоритма вычисления </a:t>
+            </a:r>
+          </a:p>
+          <a:p>
+            <a:pPr marL="0" indent="0">
+              <a:buNone/>
+            </a:pPr>
+            <a:r>
+              <a:rPr lang="ru-RU" dirty="0">
+                <a:latin typeface="Times New Roman" panose="02020603050405020304" pitchFamily="18" charset="0"/>
+                <a:cs typeface="Times New Roman" panose="02020603050405020304" pitchFamily="18" charset="0"/>
+              </a:rPr>
+              <a:t>ионосферной поправки получить </a:t>
+            </a:r>
+          </a:p>
+          <a:p>
+            <a:pPr marL="0" indent="0">
+              <a:buNone/>
+            </a:pPr>
+            <a:r>
+              <a:rPr lang="ru-RU" dirty="0">
+                <a:latin typeface="Times New Roman" panose="02020603050405020304" pitchFamily="18" charset="0"/>
+                <a:cs typeface="Times New Roman" panose="02020603050405020304" pitchFamily="18" charset="0"/>
+              </a:rPr>
+              <a:t>соответствующие зависимости от </a:t>
+            </a:r>
+          </a:p>
+          <a:p>
+            <a:pPr marL="0" indent="0">
+              <a:buNone/>
+            </a:pPr>
+            <a:r>
+              <a:rPr lang="ru-RU" dirty="0">
+                <a:latin typeface="Times New Roman" panose="02020603050405020304" pitchFamily="18" charset="0"/>
+                <a:cs typeface="Times New Roman" panose="02020603050405020304" pitchFamily="18" charset="0"/>
+              </a:rPr>
+              <a:t>времени суток</a:t>
+            </a:r>
+          </a:p>
+          <a:p>
+            <a:r>
+              <a:rPr lang="ru-RU" dirty="0">
+                <a:latin typeface="Times New Roman" panose="02020603050405020304" pitchFamily="18" charset="0"/>
+                <a:cs typeface="Times New Roman" panose="02020603050405020304" pitchFamily="18" charset="0"/>
+              </a:rPr>
+              <a:t>Получить аналогичные зависимости с </a:t>
+            </a:r>
+          </a:p>
+          <a:p>
+            <a:pPr marL="0" indent="0">
+              <a:buNone/>
+            </a:pPr>
+            <a:r>
+              <a:rPr lang="ru-RU" dirty="0">
+                <a:latin typeface="Times New Roman" panose="02020603050405020304" pitchFamily="18" charset="0"/>
+                <a:cs typeface="Times New Roman" panose="02020603050405020304" pitchFamily="18" charset="0"/>
+              </a:rPr>
+              <a:t>помощью измерений </a:t>
+            </a:r>
+            <a:r>
+              <a:rPr lang="ru-RU" dirty="0" err="1">
+                <a:latin typeface="Times New Roman" panose="02020603050405020304" pitchFamily="18" charset="0"/>
+                <a:cs typeface="Times New Roman" panose="02020603050405020304" pitchFamily="18" charset="0"/>
+              </a:rPr>
+              <a:t>псевдодальности</a:t>
+            </a:r>
+            <a:endParaRPr lang="ru-RU" dirty="0">
+              <a:latin typeface="Times New Roman" panose="02020603050405020304" pitchFamily="18" charset="0"/>
+              <a:cs typeface="Times New Roman" panose="02020603050405020304" pitchFamily="18" charset="0"/>
+            </a:endParaRPr>
+          </a:p>
+          <a:p>
+            <a:r>
+              <a:rPr lang="ru-RU" dirty="0">
+                <a:latin typeface="Times New Roman" panose="02020603050405020304" pitchFamily="18" charset="0"/>
+                <a:cs typeface="Times New Roman" panose="02020603050405020304" pitchFamily="18" charset="0"/>
+              </a:rPr>
+              <a:t>Проанализировать и сравнить </a:t>
+            </a:r>
+          </a:p>
+          <a:p>
+            <a:pPr marL="0" indent="0">
+              <a:buNone/>
+            </a:pPr>
+            <a:r>
+              <a:rPr lang="ru-RU" dirty="0">
+                <a:latin typeface="Times New Roman" panose="02020603050405020304" pitchFamily="18" charset="0"/>
+                <a:cs typeface="Times New Roman" panose="02020603050405020304" pitchFamily="18" charset="0"/>
+              </a:rPr>
+              <a:t>полученные результаты</a:t>
+            </a:r>
+          </a:p>
+          <a:p>
+            <a:endParaRPr lang="ru-RU" dirty="0"/>
+          </a:p>
+        </p:txBody>
+      </p:sp>
+      <p:pic>
+        <p:nvPicPr>
+          <p:cNvPr id="4" name="Рисунок 3">
+            <a:extLst>
+              <a:ext uri="{FF2B5EF4-FFF2-40B4-BE49-F238E27FC236}">
+                <a16:creationId xmlns:a16="http://schemas.microsoft.com/office/drawing/2014/main" id="{E547F539-35EA-2959-D6A3-4A755A79DC47}"/>
+              </a:ext>
+            </a:extLst>
+          </p:cNvPr>
+          <p:cNvPicPr>
+            <a:picLocks noChangeAspect="1"/>
+          </p:cNvPicPr>
+          <p:nvPr/>
+        </p:nvPicPr>
+        <p:blipFill>
+          <a:blip r:embed="rId2"/>
+          <a:stretch>
+            <a:fillRect/>
+          </a:stretch>
+        </p:blipFill>
+        <p:spPr>
+          <a:xfrm>
+            <a:off x="6955362" y="1594392"/>
+            <a:ext cx="4935394" cy="4683316"/>
+          </a:xfrm>
+          <a:prstGeom prst="rect">
+            <a:avLst/>
+          </a:prstGeom>
+        </p:spPr>
+      </p:pic>
+    </p:spTree>
+    <p:extLst>
+      <p:ext uri="{BB962C8B-B14F-4D97-AF65-F5344CB8AC3E}">
+        <p14:creationId xmlns:p14="http://schemas.microsoft.com/office/powerpoint/2010/main" val="1064601681"/>
+      </p:ext>
+    </p:extLst>
+  </p:cSld>
+  <p:clrMapOvr>
+    <a:masterClrMapping/>
+  </p:clrMapOvr>
+</p:sld>
+</file>
+
+<file path=ppt/slides/slide4.xml><?xml version="1.0" encoding="utf-8"?>
+<p:sld xmlns:a="http://schemas.openxmlformats.org/drawingml/2006/main" xmlns:r="http://schemas.openxmlformats.org/officeDocument/2006/relationships" xmlns:p="http://schemas.openxmlformats.org/presentationml/2006/main">
+  <p:cSld>
+    <p:spTree>
+      <p:nvGrpSpPr>
+        <p:cNvPr id="1" name=""/>
+        <p:cNvGrpSpPr/>
+        <p:nvPr/>
+      </p:nvGrpSpPr>
+      <p:grpSpPr>
+        <a:xfrm>
+          <a:off x="0" y="0"/>
+          <a:ext cx="0" cy="0"/>
+          <a:chOff x="0" y="0"/>
+          <a:chExt cx="0" cy="0"/>
+        </a:xfrm>
+      </p:grpSpPr>
+      <p:sp>
+        <p:nvSpPr>
+          <p:cNvPr id="2" name="Заголовок 1">
+            <a:extLst>
+              <a:ext uri="{FF2B5EF4-FFF2-40B4-BE49-F238E27FC236}">
+                <a16:creationId xmlns:a16="http://schemas.microsoft.com/office/drawing/2014/main" id="{112DC8A5-97BD-23BE-6D49-D877EBFE9AD9}"/>
+              </a:ext>
+            </a:extLst>
+          </p:cNvPr>
+          <p:cNvSpPr>
+            <a:spLocks noGrp="1"/>
+          </p:cNvSpPr>
+          <p:nvPr>
+            <p:ph type="title"/>
+          </p:nvPr>
+        </p:nvSpPr>
+        <p:spPr/>
+        <p:txBody>
+          <a:bodyPr/>
+          <a:lstStyle/>
+          <a:p>
+            <a:r>
+              <a:rPr lang="ru-RU" dirty="0"/>
+              <a:t>Входные данные</a:t>
+            </a:r>
+          </a:p>
+        </p:txBody>
+      </p:sp>
+      <p:sp>
+        <p:nvSpPr>
+          <p:cNvPr id="3" name="Объект 2">
+            <a:extLst>
+              <a:ext uri="{FF2B5EF4-FFF2-40B4-BE49-F238E27FC236}">
+                <a16:creationId xmlns:a16="http://schemas.microsoft.com/office/drawing/2014/main" id="{0E81E7C9-F91A-2BC1-017A-3E7CACCE47DA}"/>
+              </a:ext>
+            </a:extLst>
+          </p:cNvPr>
+          <p:cNvSpPr>
+            <a:spLocks noGrp="1"/>
+          </p:cNvSpPr>
+          <p:nvPr>
+            <p:ph idx="1"/>
+          </p:nvPr>
+        </p:nvSpPr>
+        <p:spPr/>
+        <p:txBody>
+          <a:bodyPr/>
+          <a:lstStyle/>
+          <a:p>
+            <a:endParaRPr lang="ru-RU" dirty="0"/>
+          </a:p>
+          <a:p>
+            <a:endParaRPr lang="ru-RU" dirty="0"/>
+          </a:p>
+          <a:p>
+            <a:endParaRPr lang="ru-RU" dirty="0"/>
+          </a:p>
+        </p:txBody>
+      </p:sp>
+      <p:pic>
+        <p:nvPicPr>
+          <p:cNvPr id="5" name="Рисунок 4">
+            <a:extLst>
+              <a:ext uri="{FF2B5EF4-FFF2-40B4-BE49-F238E27FC236}">
+                <a16:creationId xmlns:a16="http://schemas.microsoft.com/office/drawing/2014/main" id="{093521F4-03AA-7E12-4D46-766DB5A07928}"/>
+              </a:ext>
+            </a:extLst>
+          </p:cNvPr>
+          <p:cNvPicPr>
+            <a:picLocks noChangeAspect="1"/>
+          </p:cNvPicPr>
+          <p:nvPr/>
+        </p:nvPicPr>
+        <p:blipFill>
+          <a:blip r:embed="rId2"/>
+          <a:stretch>
+            <a:fillRect/>
+          </a:stretch>
+        </p:blipFill>
+        <p:spPr>
+          <a:xfrm>
+            <a:off x="838200" y="1690688"/>
+            <a:ext cx="3046200" cy="1319372"/>
+          </a:xfrm>
+          <a:prstGeom prst="rect">
+            <a:avLst/>
+          </a:prstGeom>
+        </p:spPr>
+      </p:pic>
+      <p:pic>
+        <p:nvPicPr>
+          <p:cNvPr id="7" name="Рисунок 6">
+            <a:extLst>
+              <a:ext uri="{FF2B5EF4-FFF2-40B4-BE49-F238E27FC236}">
+                <a16:creationId xmlns:a16="http://schemas.microsoft.com/office/drawing/2014/main" id="{391B4A6F-7973-C15E-5AFF-60A2EAB6A525}"/>
+              </a:ext>
+            </a:extLst>
+          </p:cNvPr>
+          <p:cNvPicPr>
+            <a:picLocks noChangeAspect="1"/>
+          </p:cNvPicPr>
+          <p:nvPr/>
+        </p:nvPicPr>
+        <p:blipFill>
+          <a:blip r:embed="rId3"/>
+          <a:stretch>
+            <a:fillRect/>
+          </a:stretch>
+        </p:blipFill>
+        <p:spPr>
+          <a:xfrm>
+            <a:off x="2106309" y="2941753"/>
+            <a:ext cx="7979381" cy="2335428"/>
+          </a:xfrm>
+          <a:prstGeom prst="rect">
+            <a:avLst/>
+          </a:prstGeom>
+        </p:spPr>
+      </p:pic>
+      <p:pic>
+        <p:nvPicPr>
+          <p:cNvPr id="6" name="Рисунок 5">
+            <a:extLst>
+              <a:ext uri="{FF2B5EF4-FFF2-40B4-BE49-F238E27FC236}">
+                <a16:creationId xmlns:a16="http://schemas.microsoft.com/office/drawing/2014/main" id="{D3E2CC07-D972-5043-F5C3-4DA8E60EAB56}"/>
+              </a:ext>
+            </a:extLst>
+          </p:cNvPr>
+          <p:cNvPicPr>
+            <a:picLocks noChangeAspect="1"/>
+          </p:cNvPicPr>
+          <p:nvPr/>
+        </p:nvPicPr>
+        <p:blipFill>
+          <a:blip r:embed="rId4"/>
+          <a:stretch>
+            <a:fillRect/>
+          </a:stretch>
+        </p:blipFill>
+        <p:spPr>
+          <a:xfrm>
+            <a:off x="5884984" y="1758995"/>
+            <a:ext cx="5083040" cy="1182758"/>
+          </a:xfrm>
+          <a:prstGeom prst="rect">
+            <a:avLst/>
+          </a:prstGeom>
+        </p:spPr>
+      </p:pic>
+    </p:spTree>
+    <p:extLst>
+      <p:ext uri="{BB962C8B-B14F-4D97-AF65-F5344CB8AC3E}">
+        <p14:creationId xmlns:p14="http://schemas.microsoft.com/office/powerpoint/2010/main" val="709186554"/>
+      </p:ext>
+    </p:extLst>
+  </p:cSld>
+  <p:clrMapOvr>
+    <a:masterClrMapping/>
+  </p:clrMapOvr>
+</p:sld>
+</file>
+
+<file path=ppt/slides/slide5.xml><?xml version="1.0" encoding="utf-8"?>
+<p:sld xmlns:a="http://schemas.openxmlformats.org/drawingml/2006/main" xmlns:r="http://schemas.openxmlformats.org/officeDocument/2006/relationships" xmlns:p="http://schemas.openxmlformats.org/presentationml/2006/main">
+  <p:cSld>
+    <p:spTree>
+      <p:nvGrpSpPr>
+        <p:cNvPr id="1" name=""/>
+        <p:cNvGrpSpPr/>
+        <p:nvPr/>
+      </p:nvGrpSpPr>
+      <p:grpSpPr>
+        <a:xfrm>
+          <a:off x="0" y="0"/>
+          <a:ext cx="0" cy="0"/>
+          <a:chOff x="0" y="0"/>
+          <a:chExt cx="0" cy="0"/>
+        </a:xfrm>
+      </p:grpSpPr>
+      <p:sp>
+        <p:nvSpPr>
+          <p:cNvPr id="2" name="Заголовок 1">
+            <a:extLst>
+              <a:ext uri="{FF2B5EF4-FFF2-40B4-BE49-F238E27FC236}">
+                <a16:creationId xmlns:a16="http://schemas.microsoft.com/office/drawing/2014/main" id="{6C147EBB-2A9B-9C5C-4C91-7B5F13CC1A64}"/>
+              </a:ext>
+            </a:extLst>
+          </p:cNvPr>
+          <p:cNvSpPr>
+            <a:spLocks noGrp="1"/>
+          </p:cNvSpPr>
+          <p:nvPr>
+            <p:ph type="title"/>
+          </p:nvPr>
+        </p:nvSpPr>
+        <p:spPr/>
+        <p:txBody>
+          <a:bodyPr/>
+          <a:lstStyle/>
+          <a:p>
+            <a:r>
+              <a:rPr lang="ru-RU" dirty="0"/>
+              <a:t>Использование</a:t>
+            </a:r>
+          </a:p>
+        </p:txBody>
+      </p:sp>
+      <p:pic>
+        <p:nvPicPr>
+          <p:cNvPr id="6" name="Рисунок 5">
+            <a:extLst>
+              <a:ext uri="{FF2B5EF4-FFF2-40B4-BE49-F238E27FC236}">
+                <a16:creationId xmlns:a16="http://schemas.microsoft.com/office/drawing/2014/main" id="{AEE323C6-8EC2-6E4A-0C03-C35AFD1B6AF5}"/>
+              </a:ext>
+            </a:extLst>
+          </p:cNvPr>
+          <p:cNvPicPr>
+            <a:picLocks noChangeAspect="1"/>
+          </p:cNvPicPr>
+          <p:nvPr/>
+        </p:nvPicPr>
+        <p:blipFill>
+          <a:blip r:embed="rId2"/>
+          <a:stretch>
+            <a:fillRect/>
+          </a:stretch>
+        </p:blipFill>
+        <p:spPr>
+          <a:xfrm>
+            <a:off x="1024876" y="1690688"/>
+            <a:ext cx="10142248" cy="4351338"/>
+          </a:xfrm>
+          <a:prstGeom prst="rect">
+            <a:avLst/>
+          </a:prstGeom>
+        </p:spPr>
+      </p:pic>
+    </p:spTree>
+    <p:extLst>
+      <p:ext uri="{BB962C8B-B14F-4D97-AF65-F5344CB8AC3E}">
+        <p14:creationId xmlns:p14="http://schemas.microsoft.com/office/powerpoint/2010/main" val="3606665906"/>
+      </p:ext>
+    </p:extLst>
+  </p:cSld>
+  <p:clrMapOvr>
+    <a:masterClrMapping/>
+  </p:clrMapOvr>
+</p:sld>
+</file>
+
+<file path=ppt/slides/slide6.xml><?xml version="1.0" encoding="utf-8"?>
+<p:sld xmlns:a="http://schemas.openxmlformats.org/drawingml/2006/main" xmlns:r="http://schemas.openxmlformats.org/officeDocument/2006/relationships" xmlns:p="http://schemas.openxmlformats.org/presentationml/2006/main">
+  <p:cSld>
+    <p:spTree>
+      <p:nvGrpSpPr>
+        <p:cNvPr id="1" name=""/>
+        <p:cNvGrpSpPr/>
+        <p:nvPr/>
+      </p:nvGrpSpPr>
+      <p:grpSpPr>
+        <a:xfrm>
+          <a:off x="0" y="0"/>
+          <a:ext cx="0" cy="0"/>
+          <a:chOff x="0" y="0"/>
+          <a:chExt cx="0" cy="0"/>
+        </a:xfrm>
+      </p:grpSpPr>
       <p:sp>
         <p:nvSpPr>
           <p:cNvPr id="2" name="Заголовок 1">
@@ -3581,125 +4691,7 @@
 </p:sld>
 </file>
 
-<file path=ppt/slides/slide11.xml><?xml version="1.0" encoding="utf-8"?>
-<p:sld xmlns:a="http://schemas.openxmlformats.org/drawingml/2006/main" xmlns:r="http://schemas.openxmlformats.org/officeDocument/2006/relationships" xmlns:p="http://schemas.openxmlformats.org/presentationml/2006/main">
-  <p:cSld>
-    <p:spTree>
-      <p:nvGrpSpPr>
-        <p:cNvPr id="1" name=""/>
-        <p:cNvGrpSpPr/>
-        <p:nvPr/>
-      </p:nvGrpSpPr>
-      <p:grpSpPr>
-        <a:xfrm>
-          <a:off x="0" y="0"/>
-          <a:ext cx="0" cy="0"/>
-          <a:chOff x="0" y="0"/>
-          <a:chExt cx="0" cy="0"/>
-        </a:xfrm>
-      </p:grpSpPr>
-      <p:sp>
-        <p:nvSpPr>
-          <p:cNvPr id="2" name="Заголовок 1">
-            <a:extLst>
-              <a:ext uri="{FF2B5EF4-FFF2-40B4-BE49-F238E27FC236}">
-                <a16:creationId xmlns:a16="http://schemas.microsoft.com/office/drawing/2014/main" id="{3C588BB9-3738-DEE8-2160-D69FA2671E5B}"/>
-              </a:ext>
-            </a:extLst>
-          </p:cNvPr>
-          <p:cNvSpPr>
-            <a:spLocks noGrp="1"/>
-          </p:cNvSpPr>
-          <p:nvPr>
-            <p:ph type="title"/>
-          </p:nvPr>
-        </p:nvSpPr>
-        <p:spPr/>
-        <p:txBody>
-          <a:bodyPr/>
-          <a:lstStyle/>
-          <a:p>
-            <a:r>
-              <a:rPr lang="ru-RU" dirty="0"/>
-              <a:t>Входные данные</a:t>
-            </a:r>
-          </a:p>
-        </p:txBody>
-      </p:sp>
-      <p:pic>
-        <p:nvPicPr>
-          <p:cNvPr id="4" name="Объект 5">
-            <a:extLst>
-              <a:ext uri="{FF2B5EF4-FFF2-40B4-BE49-F238E27FC236}">
-                <a16:creationId xmlns:a16="http://schemas.microsoft.com/office/drawing/2014/main" id="{9F33648D-3695-1C2E-984D-BFCFE8325549}"/>
-              </a:ext>
-            </a:extLst>
-          </p:cNvPr>
-          <p:cNvPicPr>
-            <a:picLocks noChangeAspect="1"/>
-          </p:cNvPicPr>
-          <p:nvPr/>
-        </p:nvPicPr>
-        <p:blipFill>
-          <a:blip r:embed="rId2"/>
-          <a:stretch>
-            <a:fillRect/>
-          </a:stretch>
-        </p:blipFill>
-        <p:spPr>
-          <a:xfrm>
-            <a:off x="398136" y="1690688"/>
-            <a:ext cx="5697864" cy="4351338"/>
-          </a:xfrm>
-          <a:prstGeom prst="rect">
-            <a:avLst/>
-          </a:prstGeom>
-        </p:spPr>
-      </p:pic>
-      <p:pic>
-        <p:nvPicPr>
-          <p:cNvPr id="5" name="Рисунок 4">
-            <a:extLst>
-              <a:ext uri="{FF2B5EF4-FFF2-40B4-BE49-F238E27FC236}">
-                <a16:creationId xmlns:a16="http://schemas.microsoft.com/office/drawing/2014/main" id="{E86EE153-6573-9B9D-4DC4-70FE078F0CAA}"/>
-              </a:ext>
-            </a:extLst>
-          </p:cNvPr>
-          <p:cNvPicPr>
-            <a:picLocks noChangeAspect="1"/>
-          </p:cNvPicPr>
-          <p:nvPr/>
-        </p:nvPicPr>
-        <p:blipFill>
-          <a:blip r:embed="rId3"/>
-          <a:stretch>
-            <a:fillRect/>
-          </a:stretch>
-        </p:blipFill>
-        <p:spPr>
-          <a:xfrm>
-            <a:off x="6096000" y="1690688"/>
-            <a:ext cx="6001588" cy="2362530"/>
-          </a:xfrm>
-          <a:prstGeom prst="rect">
-            <a:avLst/>
-          </a:prstGeom>
-        </p:spPr>
-      </p:pic>
-    </p:spTree>
-    <p:extLst>
-      <p:ext uri="{BB962C8B-B14F-4D97-AF65-F5344CB8AC3E}">
-        <p14:creationId xmlns:p14="http://schemas.microsoft.com/office/powerpoint/2010/main" val="2295279297"/>
-      </p:ext>
-    </p:extLst>
-  </p:cSld>
-  <p:clrMapOvr>
-    <a:masterClrMapping/>
-  </p:clrMapOvr>
-</p:sld>
-</file>
-
-<file path=ppt/slides/slide12.xml><?xml version="1.0" encoding="utf-8"?>
+<file path=ppt/slides/slide7.xml><?xml version="1.0" encoding="utf-8"?>
 <p:sld xmlns:a="http://schemas.openxmlformats.org/drawingml/2006/main" xmlns:r="http://schemas.openxmlformats.org/officeDocument/2006/relationships" xmlns:p="http://schemas.openxmlformats.org/presentationml/2006/main">
   <p:cSld>
     <p:spTree>
@@ -3787,1179 +4779,6 @@
 </p:sld>
 </file>
 
-<file path=ppt/slides/slide13.xml><?xml version="1.0" encoding="utf-8"?>
-<p:sld xmlns:a="http://schemas.openxmlformats.org/drawingml/2006/main" xmlns:r="http://schemas.openxmlformats.org/officeDocument/2006/relationships" xmlns:p="http://schemas.openxmlformats.org/presentationml/2006/main">
-  <p:cSld>
-    <p:spTree>
-      <p:nvGrpSpPr>
-        <p:cNvPr id="1" name=""/>
-        <p:cNvGrpSpPr/>
-        <p:nvPr/>
-      </p:nvGrpSpPr>
-      <p:grpSpPr>
-        <a:xfrm>
-          <a:off x="0" y="0"/>
-          <a:ext cx="0" cy="0"/>
-          <a:chOff x="0" y="0"/>
-          <a:chExt cx="0" cy="0"/>
-        </a:xfrm>
-      </p:grpSpPr>
-      <p:sp>
-        <p:nvSpPr>
-          <p:cNvPr id="2" name="Заголовок 1">
-            <a:extLst>
-              <a:ext uri="{FF2B5EF4-FFF2-40B4-BE49-F238E27FC236}">
-                <a16:creationId xmlns:a16="http://schemas.microsoft.com/office/drawing/2014/main" id="{26FD2397-334B-3912-A838-243FC2C763E8}"/>
-              </a:ext>
-            </a:extLst>
-          </p:cNvPr>
-          <p:cNvSpPr>
-            <a:spLocks noGrp="1"/>
-          </p:cNvSpPr>
-          <p:nvPr>
-            <p:ph type="title"/>
-          </p:nvPr>
-        </p:nvSpPr>
-        <p:spPr/>
-        <p:txBody>
-          <a:bodyPr/>
-          <a:lstStyle/>
-          <a:p>
-            <a:r>
-              <a:rPr lang="ru-RU" dirty="0"/>
-              <a:t>Анализ результатов</a:t>
-            </a:r>
-          </a:p>
-        </p:txBody>
-      </p:sp>
-      <p:pic>
-        <p:nvPicPr>
-          <p:cNvPr id="5" name="Рисунок 4">
-            <a:extLst>
-              <a:ext uri="{FF2B5EF4-FFF2-40B4-BE49-F238E27FC236}">
-                <a16:creationId xmlns:a16="http://schemas.microsoft.com/office/drawing/2014/main" id="{BB0C930D-585F-7284-F74A-D5F9A8C76C44}"/>
-              </a:ext>
-            </a:extLst>
-          </p:cNvPr>
-          <p:cNvPicPr>
-            <a:picLocks noChangeAspect="1"/>
-          </p:cNvPicPr>
-          <p:nvPr/>
-        </p:nvPicPr>
-        <p:blipFill>
-          <a:blip r:embed="rId2"/>
-          <a:stretch>
-            <a:fillRect/>
-          </a:stretch>
-        </p:blipFill>
-        <p:spPr>
-          <a:xfrm>
-            <a:off x="1525979" y="1690688"/>
-            <a:ext cx="9140042" cy="4675637"/>
-          </a:xfrm>
-          <a:prstGeom prst="rect">
-            <a:avLst/>
-          </a:prstGeom>
-        </p:spPr>
-      </p:pic>
-    </p:spTree>
-    <p:extLst>
-      <p:ext uri="{BB962C8B-B14F-4D97-AF65-F5344CB8AC3E}">
-        <p14:creationId xmlns:p14="http://schemas.microsoft.com/office/powerpoint/2010/main" val="1832665835"/>
-      </p:ext>
-    </p:extLst>
-  </p:cSld>
-  <p:clrMapOvr>
-    <a:masterClrMapping/>
-  </p:clrMapOvr>
-</p:sld>
-</file>
-
-<file path=ppt/slides/slide14.xml><?xml version="1.0" encoding="utf-8"?>
-<p:sld xmlns:a="http://schemas.openxmlformats.org/drawingml/2006/main" xmlns:r="http://schemas.openxmlformats.org/officeDocument/2006/relationships" xmlns:p="http://schemas.openxmlformats.org/presentationml/2006/main">
-  <p:cSld>
-    <p:spTree>
-      <p:nvGrpSpPr>
-        <p:cNvPr id="1" name=""/>
-        <p:cNvGrpSpPr/>
-        <p:nvPr/>
-      </p:nvGrpSpPr>
-      <p:grpSpPr>
-        <a:xfrm>
-          <a:off x="0" y="0"/>
-          <a:ext cx="0" cy="0"/>
-          <a:chOff x="0" y="0"/>
-          <a:chExt cx="0" cy="0"/>
-        </a:xfrm>
-      </p:grpSpPr>
-      <p:sp>
-        <p:nvSpPr>
-          <p:cNvPr id="2" name="Заголовок 1">
-            <a:extLst>
-              <a:ext uri="{FF2B5EF4-FFF2-40B4-BE49-F238E27FC236}">
-                <a16:creationId xmlns:a16="http://schemas.microsoft.com/office/drawing/2014/main" id="{671026CD-5492-C48B-2FFD-4DAE39D864AA}"/>
-              </a:ext>
-            </a:extLst>
-          </p:cNvPr>
-          <p:cNvSpPr>
-            <a:spLocks noGrp="1"/>
-          </p:cNvSpPr>
-          <p:nvPr>
-            <p:ph type="title"/>
-          </p:nvPr>
-        </p:nvSpPr>
-        <p:spPr/>
-        <p:txBody>
-          <a:bodyPr/>
-          <a:lstStyle/>
-          <a:p>
-            <a:r>
-              <a:rPr lang="ru-RU" dirty="0"/>
-              <a:t>Анализ результатов</a:t>
-            </a:r>
-          </a:p>
-        </p:txBody>
-      </p:sp>
-      <p:pic>
-        <p:nvPicPr>
-          <p:cNvPr id="9" name="Объект 8">
-            <a:extLst>
-              <a:ext uri="{FF2B5EF4-FFF2-40B4-BE49-F238E27FC236}">
-                <a16:creationId xmlns:a16="http://schemas.microsoft.com/office/drawing/2014/main" id="{4F10C67E-F109-4C47-8926-80B1E78C9B4A}"/>
-              </a:ext>
-            </a:extLst>
-          </p:cNvPr>
-          <p:cNvPicPr>
-            <a:picLocks noGrp="1" noChangeAspect="1"/>
-          </p:cNvPicPr>
-          <p:nvPr>
-            <p:ph idx="1"/>
-          </p:nvPr>
-        </p:nvPicPr>
-        <p:blipFill>
-          <a:blip r:embed="rId2">
-            <a:extLst>
-              <a:ext uri="{28A0092B-C50C-407E-A947-70E740481C1C}">
-                <a14:useLocalDpi xmlns:a14="http://schemas.microsoft.com/office/drawing/2010/main" val="0"/>
-              </a:ext>
-            </a:extLst>
-          </a:blip>
-          <a:stretch>
-            <a:fillRect/>
-          </a:stretch>
-        </p:blipFill>
-        <p:spPr>
-          <a:xfrm>
-            <a:off x="700572" y="1592421"/>
-            <a:ext cx="5395428" cy="3673158"/>
-          </a:xfrm>
-        </p:spPr>
-      </p:pic>
-      <p:pic>
-        <p:nvPicPr>
-          <p:cNvPr id="13" name="Рисунок 12">
-            <a:extLst>
-              <a:ext uri="{FF2B5EF4-FFF2-40B4-BE49-F238E27FC236}">
-                <a16:creationId xmlns:a16="http://schemas.microsoft.com/office/drawing/2014/main" id="{9B7A1E1E-B2AA-F0F8-C6D4-CABFD2720D57}"/>
-              </a:ext>
-            </a:extLst>
-          </p:cNvPr>
-          <p:cNvPicPr>
-            <a:picLocks noChangeAspect="1"/>
-          </p:cNvPicPr>
-          <p:nvPr/>
-        </p:nvPicPr>
-        <p:blipFill>
-          <a:blip r:embed="rId3">
-            <a:extLst>
-              <a:ext uri="{28A0092B-C50C-407E-A947-70E740481C1C}">
-                <a14:useLocalDpi xmlns:a14="http://schemas.microsoft.com/office/drawing/2010/main" val="0"/>
-              </a:ext>
-            </a:extLst>
-          </a:blip>
-          <a:stretch>
-            <a:fillRect/>
-          </a:stretch>
-        </p:blipFill>
-        <p:spPr>
-          <a:xfrm>
-            <a:off x="6096000" y="2259386"/>
-            <a:ext cx="5993914" cy="2339228"/>
-          </a:xfrm>
-          <a:prstGeom prst="rect">
-            <a:avLst/>
-          </a:prstGeom>
-        </p:spPr>
-      </p:pic>
-    </p:spTree>
-    <p:extLst>
-      <p:ext uri="{BB962C8B-B14F-4D97-AF65-F5344CB8AC3E}">
-        <p14:creationId xmlns:p14="http://schemas.microsoft.com/office/powerpoint/2010/main" val="1641986736"/>
-      </p:ext>
-    </p:extLst>
-  </p:cSld>
-  <p:clrMapOvr>
-    <a:masterClrMapping/>
-  </p:clrMapOvr>
-</p:sld>
-</file>
-
-<file path=ppt/slides/slide15.xml><?xml version="1.0" encoding="utf-8"?>
-<p:sld xmlns:a="http://schemas.openxmlformats.org/drawingml/2006/main" xmlns:r="http://schemas.openxmlformats.org/officeDocument/2006/relationships" xmlns:p="http://schemas.openxmlformats.org/presentationml/2006/main">
-  <p:cSld>
-    <p:spTree>
-      <p:nvGrpSpPr>
-        <p:cNvPr id="1" name=""/>
-        <p:cNvGrpSpPr/>
-        <p:nvPr/>
-      </p:nvGrpSpPr>
-      <p:grpSpPr>
-        <a:xfrm>
-          <a:off x="0" y="0"/>
-          <a:ext cx="0" cy="0"/>
-          <a:chOff x="0" y="0"/>
-          <a:chExt cx="0" cy="0"/>
-        </a:xfrm>
-      </p:grpSpPr>
-      <p:sp>
-        <p:nvSpPr>
-          <p:cNvPr id="2" name="Заголовок 1">
-            <a:extLst>
-              <a:ext uri="{FF2B5EF4-FFF2-40B4-BE49-F238E27FC236}">
-                <a16:creationId xmlns:a16="http://schemas.microsoft.com/office/drawing/2014/main" id="{BC2B1F72-7EA4-68E6-3042-1E868C47D93E}"/>
-              </a:ext>
-            </a:extLst>
-          </p:cNvPr>
-          <p:cNvSpPr>
-            <a:spLocks noGrp="1"/>
-          </p:cNvSpPr>
-          <p:nvPr>
-            <p:ph type="title"/>
-          </p:nvPr>
-        </p:nvSpPr>
-        <p:spPr/>
-        <p:txBody>
-          <a:bodyPr/>
-          <a:lstStyle/>
-          <a:p>
-            <a:r>
-              <a:rPr lang="ru-RU" dirty="0"/>
-              <a:t>Анализ результатов</a:t>
-            </a:r>
-          </a:p>
-        </p:txBody>
-      </p:sp>
-      <p:pic>
-        <p:nvPicPr>
-          <p:cNvPr id="4" name="Объект 4">
-            <a:extLst>
-              <a:ext uri="{FF2B5EF4-FFF2-40B4-BE49-F238E27FC236}">
-                <a16:creationId xmlns:a16="http://schemas.microsoft.com/office/drawing/2014/main" id="{D2DF7A3F-6B4E-945F-A9CE-58F71302FDC9}"/>
-              </a:ext>
-            </a:extLst>
-          </p:cNvPr>
-          <p:cNvPicPr>
-            <a:picLocks noGrp="1" noChangeAspect="1"/>
-          </p:cNvPicPr>
-          <p:nvPr>
-            <p:ph idx="1"/>
-          </p:nvPr>
-        </p:nvPicPr>
-        <p:blipFill rotWithShape="1">
-          <a:blip r:embed="rId2">
-            <a:extLst>
-              <a:ext uri="{28A0092B-C50C-407E-A947-70E740481C1C}">
-                <a14:useLocalDpi xmlns:a14="http://schemas.microsoft.com/office/drawing/2010/main" val="0"/>
-              </a:ext>
-            </a:extLst>
-          </a:blip>
-          <a:srcRect l="8922" t="8843" r="8783" b="2860"/>
-          <a:stretch/>
-        </p:blipFill>
-        <p:spPr>
-          <a:xfrm>
-            <a:off x="838200" y="1690688"/>
-            <a:ext cx="4258088" cy="2296246"/>
-          </a:xfrm>
-        </p:spPr>
-      </p:pic>
-      <p:pic>
-        <p:nvPicPr>
-          <p:cNvPr id="6" name="Рисунок 5">
-            <a:extLst>
-              <a:ext uri="{FF2B5EF4-FFF2-40B4-BE49-F238E27FC236}">
-                <a16:creationId xmlns:a16="http://schemas.microsoft.com/office/drawing/2014/main" id="{C2534A14-7A02-9352-79B3-E6B303D3B219}"/>
-              </a:ext>
-            </a:extLst>
-          </p:cNvPr>
-          <p:cNvPicPr>
-            <a:picLocks noChangeAspect="1"/>
-          </p:cNvPicPr>
-          <p:nvPr/>
-        </p:nvPicPr>
-        <p:blipFill rotWithShape="1">
-          <a:blip r:embed="rId3">
-            <a:extLst>
-              <a:ext uri="{28A0092B-C50C-407E-A947-70E740481C1C}">
-                <a14:useLocalDpi xmlns:a14="http://schemas.microsoft.com/office/drawing/2010/main" val="0"/>
-              </a:ext>
-            </a:extLst>
-          </a:blip>
-          <a:srcRect l="7514" t="8579" r="7797" b="3772"/>
-          <a:stretch/>
-        </p:blipFill>
-        <p:spPr>
-          <a:xfrm>
-            <a:off x="6864654" y="1699594"/>
-            <a:ext cx="4414489" cy="2296246"/>
-          </a:xfrm>
-          <a:prstGeom prst="rect">
-            <a:avLst/>
-          </a:prstGeom>
-        </p:spPr>
-      </p:pic>
-      <p:pic>
-        <p:nvPicPr>
-          <p:cNvPr id="8" name="Рисунок 7">
-            <a:extLst>
-              <a:ext uri="{FF2B5EF4-FFF2-40B4-BE49-F238E27FC236}">
-                <a16:creationId xmlns:a16="http://schemas.microsoft.com/office/drawing/2014/main" id="{59E23D72-39D4-822C-D68B-F2A062CD9A95}"/>
-              </a:ext>
-            </a:extLst>
-          </p:cNvPr>
-          <p:cNvPicPr>
-            <a:picLocks noChangeAspect="1"/>
-          </p:cNvPicPr>
-          <p:nvPr/>
-        </p:nvPicPr>
-        <p:blipFill rotWithShape="1">
-          <a:blip r:embed="rId4">
-            <a:extLst>
-              <a:ext uri="{28A0092B-C50C-407E-A947-70E740481C1C}">
-                <a14:useLocalDpi xmlns:a14="http://schemas.microsoft.com/office/drawing/2010/main" val="0"/>
-              </a:ext>
-            </a:extLst>
-          </a:blip>
-          <a:srcRect l="9058" t="10708" r="9611" b="4797"/>
-          <a:stretch/>
-        </p:blipFill>
-        <p:spPr>
-          <a:xfrm>
-            <a:off x="838200" y="4186576"/>
-            <a:ext cx="4397627" cy="2296246"/>
-          </a:xfrm>
-          <a:prstGeom prst="rect">
-            <a:avLst/>
-          </a:prstGeom>
-        </p:spPr>
-      </p:pic>
-      <p:pic>
-        <p:nvPicPr>
-          <p:cNvPr id="10" name="Рисунок 9">
-            <a:extLst>
-              <a:ext uri="{FF2B5EF4-FFF2-40B4-BE49-F238E27FC236}">
-                <a16:creationId xmlns:a16="http://schemas.microsoft.com/office/drawing/2014/main" id="{BC3F6882-A2B6-509A-EADA-7C58BA5FA3DE}"/>
-              </a:ext>
-            </a:extLst>
-          </p:cNvPr>
-          <p:cNvPicPr>
-            <a:picLocks noChangeAspect="1"/>
-          </p:cNvPicPr>
-          <p:nvPr/>
-        </p:nvPicPr>
-        <p:blipFill rotWithShape="1">
-          <a:blip r:embed="rId5">
-            <a:extLst>
-              <a:ext uri="{28A0092B-C50C-407E-A947-70E740481C1C}">
-                <a14:useLocalDpi xmlns:a14="http://schemas.microsoft.com/office/drawing/2010/main" val="0"/>
-              </a:ext>
-            </a:extLst>
-          </a:blip>
-          <a:srcRect l="8962" t="11095" r="9610" b="4797"/>
-          <a:stretch/>
-        </p:blipFill>
-        <p:spPr>
-          <a:xfrm>
-            <a:off x="6836594" y="4186576"/>
-            <a:ext cx="4442549" cy="2306299"/>
-          </a:xfrm>
-          <a:prstGeom prst="rect">
-            <a:avLst/>
-          </a:prstGeom>
-        </p:spPr>
-      </p:pic>
-    </p:spTree>
-    <p:extLst>
-      <p:ext uri="{BB962C8B-B14F-4D97-AF65-F5344CB8AC3E}">
-        <p14:creationId xmlns:p14="http://schemas.microsoft.com/office/powerpoint/2010/main" val="1770701558"/>
-      </p:ext>
-    </p:extLst>
-  </p:cSld>
-  <p:clrMapOvr>
-    <a:masterClrMapping/>
-  </p:clrMapOvr>
-</p:sld>
-</file>
-
-<file path=ppt/slides/slide16.xml><?xml version="1.0" encoding="utf-8"?>
-<p:sld xmlns:a="http://schemas.openxmlformats.org/drawingml/2006/main" xmlns:r="http://schemas.openxmlformats.org/officeDocument/2006/relationships" xmlns:p="http://schemas.openxmlformats.org/presentationml/2006/main">
-  <p:cSld>
-    <p:spTree>
-      <p:nvGrpSpPr>
-        <p:cNvPr id="1" name=""/>
-        <p:cNvGrpSpPr/>
-        <p:nvPr/>
-      </p:nvGrpSpPr>
-      <p:grpSpPr>
-        <a:xfrm>
-          <a:off x="0" y="0"/>
-          <a:ext cx="0" cy="0"/>
-          <a:chOff x="0" y="0"/>
-          <a:chExt cx="0" cy="0"/>
-        </a:xfrm>
-      </p:grpSpPr>
-      <p:sp>
-        <p:nvSpPr>
-          <p:cNvPr id="2" name="Заголовок 1">
-            <a:extLst>
-              <a:ext uri="{FF2B5EF4-FFF2-40B4-BE49-F238E27FC236}">
-                <a16:creationId xmlns:a16="http://schemas.microsoft.com/office/drawing/2014/main" id="{B22F2EAC-507F-84EE-7B08-EDD258EBC1D5}"/>
-              </a:ext>
-            </a:extLst>
-          </p:cNvPr>
-          <p:cNvSpPr>
-            <a:spLocks noGrp="1"/>
-          </p:cNvSpPr>
-          <p:nvPr>
-            <p:ph type="title"/>
-          </p:nvPr>
-        </p:nvSpPr>
-        <p:spPr/>
-        <p:txBody>
-          <a:bodyPr/>
-          <a:lstStyle/>
-          <a:p>
-            <a:r>
-              <a:rPr lang="ru-RU" dirty="0"/>
-              <a:t>Спасибо за внимание</a:t>
-            </a:r>
-          </a:p>
-        </p:txBody>
-      </p:sp>
-    </p:spTree>
-    <p:extLst>
-      <p:ext uri="{BB962C8B-B14F-4D97-AF65-F5344CB8AC3E}">
-        <p14:creationId xmlns:p14="http://schemas.microsoft.com/office/powerpoint/2010/main" val="2695260135"/>
-      </p:ext>
-    </p:extLst>
-  </p:cSld>
-  <p:clrMapOvr>
-    <a:masterClrMapping/>
-  </p:clrMapOvr>
-</p:sld>
-</file>
-
-<file path=ppt/slides/slide2.xml><?xml version="1.0" encoding="utf-8"?>
-<p:sld xmlns:a="http://schemas.openxmlformats.org/drawingml/2006/main" xmlns:r="http://schemas.openxmlformats.org/officeDocument/2006/relationships" xmlns:p="http://schemas.openxmlformats.org/presentationml/2006/main">
-  <p:cSld>
-    <p:spTree>
-      <p:nvGrpSpPr>
-        <p:cNvPr id="1" name=""/>
-        <p:cNvGrpSpPr/>
-        <p:nvPr/>
-      </p:nvGrpSpPr>
-      <p:grpSpPr>
-        <a:xfrm>
-          <a:off x="0" y="0"/>
-          <a:ext cx="0" cy="0"/>
-          <a:chOff x="0" y="0"/>
-          <a:chExt cx="0" cy="0"/>
-        </a:xfrm>
-      </p:grpSpPr>
-      <p:sp>
-        <p:nvSpPr>
-          <p:cNvPr id="2" name="Заголовок 1">
-            <a:extLst>
-              <a:ext uri="{FF2B5EF4-FFF2-40B4-BE49-F238E27FC236}">
-                <a16:creationId xmlns:a16="http://schemas.microsoft.com/office/drawing/2014/main" id="{1D31D0D2-E06E-C28F-5933-AEC8D0E5D080}"/>
-              </a:ext>
-            </a:extLst>
-          </p:cNvPr>
-          <p:cNvSpPr>
-            <a:spLocks noGrp="1"/>
-          </p:cNvSpPr>
-          <p:nvPr>
-            <p:ph type="title"/>
-          </p:nvPr>
-        </p:nvSpPr>
-        <p:spPr/>
-        <p:txBody>
-          <a:bodyPr/>
-          <a:lstStyle/>
-          <a:p>
-            <a:r>
-              <a:rPr lang="ru-RU" dirty="0"/>
-              <a:t>Актуальность</a:t>
-            </a:r>
-          </a:p>
-        </p:txBody>
-      </p:sp>
-      <p:sp>
-        <p:nvSpPr>
-          <p:cNvPr id="3" name="Объект 2">
-            <a:extLst>
-              <a:ext uri="{FF2B5EF4-FFF2-40B4-BE49-F238E27FC236}">
-                <a16:creationId xmlns:a16="http://schemas.microsoft.com/office/drawing/2014/main" id="{7A63F2A0-01DE-422F-510F-652DC9B1D75A}"/>
-              </a:ext>
-            </a:extLst>
-          </p:cNvPr>
-          <p:cNvSpPr>
-            <a:spLocks noGrp="1"/>
-          </p:cNvSpPr>
-          <p:nvPr>
-            <p:ph idx="1"/>
-          </p:nvPr>
-        </p:nvSpPr>
-        <p:spPr/>
-        <p:txBody>
-          <a:bodyPr/>
-          <a:lstStyle/>
-          <a:p>
-            <a:endParaRPr lang="ru-RU"/>
-          </a:p>
-        </p:txBody>
-      </p:sp>
-    </p:spTree>
-    <p:extLst>
-      <p:ext uri="{BB962C8B-B14F-4D97-AF65-F5344CB8AC3E}">
-        <p14:creationId xmlns:p14="http://schemas.microsoft.com/office/powerpoint/2010/main" val="4042108325"/>
-      </p:ext>
-    </p:extLst>
-  </p:cSld>
-  <p:clrMapOvr>
-    <a:masterClrMapping/>
-  </p:clrMapOvr>
-</p:sld>
-</file>
-
-<file path=ppt/slides/slide3.xml><?xml version="1.0" encoding="utf-8"?>
-<p:sld xmlns:a="http://schemas.openxmlformats.org/drawingml/2006/main" xmlns:r="http://schemas.openxmlformats.org/officeDocument/2006/relationships" xmlns:p="http://schemas.openxmlformats.org/presentationml/2006/main">
-  <p:cSld>
-    <p:spTree>
-      <p:nvGrpSpPr>
-        <p:cNvPr id="1" name=""/>
-        <p:cNvGrpSpPr/>
-        <p:nvPr/>
-      </p:nvGrpSpPr>
-      <p:grpSpPr>
-        <a:xfrm>
-          <a:off x="0" y="0"/>
-          <a:ext cx="0" cy="0"/>
-          <a:chOff x="0" y="0"/>
-          <a:chExt cx="0" cy="0"/>
-        </a:xfrm>
-      </p:grpSpPr>
-      <p:sp>
-        <p:nvSpPr>
-          <p:cNvPr id="2" name="Заголовок 1">
-            <a:extLst>
-              <a:ext uri="{FF2B5EF4-FFF2-40B4-BE49-F238E27FC236}">
-                <a16:creationId xmlns:a16="http://schemas.microsoft.com/office/drawing/2014/main" id="{49E7EB47-3F06-7A5E-0B73-9A8CEC8D88A0}"/>
-              </a:ext>
-            </a:extLst>
-          </p:cNvPr>
-          <p:cNvSpPr>
-            <a:spLocks noGrp="1"/>
-          </p:cNvSpPr>
-          <p:nvPr>
-            <p:ph type="title"/>
-          </p:nvPr>
-        </p:nvSpPr>
-        <p:spPr/>
-        <p:txBody>
-          <a:bodyPr/>
-          <a:lstStyle/>
-          <a:p>
-            <a:r>
-              <a:rPr lang="ru-RU" dirty="0"/>
-              <a:t>Цель</a:t>
-            </a:r>
-          </a:p>
-        </p:txBody>
-      </p:sp>
-      <p:sp>
-        <p:nvSpPr>
-          <p:cNvPr id="3" name="Объект 2">
-            <a:extLst>
-              <a:ext uri="{FF2B5EF4-FFF2-40B4-BE49-F238E27FC236}">
-                <a16:creationId xmlns:a16="http://schemas.microsoft.com/office/drawing/2014/main" id="{E4379BAC-0C57-956D-1016-E6628C2EE48B}"/>
-              </a:ext>
-            </a:extLst>
-          </p:cNvPr>
-          <p:cNvSpPr>
-            <a:spLocks noGrp="1"/>
-          </p:cNvSpPr>
-          <p:nvPr>
-            <p:ph idx="1"/>
-          </p:nvPr>
-        </p:nvSpPr>
-        <p:spPr/>
-        <p:txBody>
-          <a:bodyPr/>
-          <a:lstStyle/>
-          <a:p>
-            <a:endParaRPr lang="ru-RU"/>
-          </a:p>
-        </p:txBody>
-      </p:sp>
-    </p:spTree>
-    <p:extLst>
-      <p:ext uri="{BB962C8B-B14F-4D97-AF65-F5344CB8AC3E}">
-        <p14:creationId xmlns:p14="http://schemas.microsoft.com/office/powerpoint/2010/main" val="1064601681"/>
-      </p:ext>
-    </p:extLst>
-  </p:cSld>
-  <p:clrMapOvr>
-    <a:masterClrMapping/>
-  </p:clrMapOvr>
-</p:sld>
-</file>
-
-<file path=ppt/slides/slide4.xml><?xml version="1.0" encoding="utf-8"?>
-<p:sld xmlns:a="http://schemas.openxmlformats.org/drawingml/2006/main" xmlns:r="http://schemas.openxmlformats.org/officeDocument/2006/relationships" xmlns:p="http://schemas.openxmlformats.org/presentationml/2006/main">
-  <p:cSld>
-    <p:spTree>
-      <p:nvGrpSpPr>
-        <p:cNvPr id="1" name=""/>
-        <p:cNvGrpSpPr/>
-        <p:nvPr/>
-      </p:nvGrpSpPr>
-      <p:grpSpPr>
-        <a:xfrm>
-          <a:off x="0" y="0"/>
-          <a:ext cx="0" cy="0"/>
-          <a:chOff x="0" y="0"/>
-          <a:chExt cx="0" cy="0"/>
-        </a:xfrm>
-      </p:grpSpPr>
-      <p:sp>
-        <p:nvSpPr>
-          <p:cNvPr id="2" name="Заголовок 1">
-            <a:extLst>
-              <a:ext uri="{FF2B5EF4-FFF2-40B4-BE49-F238E27FC236}">
-                <a16:creationId xmlns:a16="http://schemas.microsoft.com/office/drawing/2014/main" id="{3CED2E00-D5FD-C257-0175-41260F54FCFF}"/>
-              </a:ext>
-            </a:extLst>
-          </p:cNvPr>
-          <p:cNvSpPr>
-            <a:spLocks noGrp="1"/>
-          </p:cNvSpPr>
-          <p:nvPr>
-            <p:ph type="title"/>
-          </p:nvPr>
-        </p:nvSpPr>
-        <p:spPr/>
-        <p:txBody>
-          <a:bodyPr/>
-          <a:lstStyle/>
-          <a:p>
-            <a:r>
-              <a:rPr lang="en-US" dirty="0"/>
-              <a:t>Galileo</a:t>
-            </a:r>
-            <a:endParaRPr lang="ru-RU" dirty="0"/>
-          </a:p>
-        </p:txBody>
-      </p:sp>
-      <p:sp>
-        <p:nvSpPr>
-          <p:cNvPr id="3" name="Объект 2">
-            <a:extLst>
-              <a:ext uri="{FF2B5EF4-FFF2-40B4-BE49-F238E27FC236}">
-                <a16:creationId xmlns:a16="http://schemas.microsoft.com/office/drawing/2014/main" id="{4AF93D9E-03A0-5EAD-298E-EE0EEC8BA1F3}"/>
-              </a:ext>
-            </a:extLst>
-          </p:cNvPr>
-          <p:cNvSpPr>
-            <a:spLocks noGrp="1"/>
-          </p:cNvSpPr>
-          <p:nvPr>
-            <p:ph idx="1"/>
-          </p:nvPr>
-        </p:nvSpPr>
-        <p:spPr/>
-        <p:txBody>
-          <a:bodyPr/>
-          <a:lstStyle/>
-          <a:p>
-            <a:r>
-              <a:rPr lang="ru-RU" dirty="0"/>
-              <a:t>Есть разные системы ГНСС</a:t>
-            </a:r>
-          </a:p>
-          <a:p>
-            <a:r>
-              <a:rPr lang="en-US" dirty="0"/>
-              <a:t>Galileo – </a:t>
-            </a:r>
-            <a:r>
-              <a:rPr lang="ru-RU" dirty="0"/>
-              <a:t>новая европейская ГНСС</a:t>
-            </a:r>
-          </a:p>
-        </p:txBody>
-      </p:sp>
-    </p:spTree>
-    <p:extLst>
-      <p:ext uri="{BB962C8B-B14F-4D97-AF65-F5344CB8AC3E}">
-        <p14:creationId xmlns:p14="http://schemas.microsoft.com/office/powerpoint/2010/main" val="1172295032"/>
-      </p:ext>
-    </p:extLst>
-  </p:cSld>
-  <p:clrMapOvr>
-    <a:masterClrMapping/>
-  </p:clrMapOvr>
-</p:sld>
-</file>
-
-<file path=ppt/slides/slide5.xml><?xml version="1.0" encoding="utf-8"?>
-<p:sld xmlns:a="http://schemas.openxmlformats.org/drawingml/2006/main" xmlns:r="http://schemas.openxmlformats.org/officeDocument/2006/relationships" xmlns:p="http://schemas.openxmlformats.org/presentationml/2006/main">
-  <p:cSld>
-    <p:spTree>
-      <p:nvGrpSpPr>
-        <p:cNvPr id="1" name=""/>
-        <p:cNvGrpSpPr/>
-        <p:nvPr/>
-      </p:nvGrpSpPr>
-      <p:grpSpPr>
-        <a:xfrm>
-          <a:off x="0" y="0"/>
-          <a:ext cx="0" cy="0"/>
-          <a:chOff x="0" y="0"/>
-          <a:chExt cx="0" cy="0"/>
-        </a:xfrm>
-      </p:grpSpPr>
-      <p:sp>
-        <p:nvSpPr>
-          <p:cNvPr id="2" name="Заголовок 1">
-            <a:extLst>
-              <a:ext uri="{FF2B5EF4-FFF2-40B4-BE49-F238E27FC236}">
-                <a16:creationId xmlns:a16="http://schemas.microsoft.com/office/drawing/2014/main" id="{9D8FCC93-F9C6-071E-42E2-FF8357872D8A}"/>
-              </a:ext>
-            </a:extLst>
-          </p:cNvPr>
-          <p:cNvSpPr>
-            <a:spLocks noGrp="1"/>
-          </p:cNvSpPr>
-          <p:nvPr>
-            <p:ph type="title"/>
-          </p:nvPr>
-        </p:nvSpPr>
-        <p:spPr/>
-        <p:txBody>
-          <a:bodyPr/>
-          <a:lstStyle/>
-          <a:p>
-            <a:r>
-              <a:rPr lang="ru-RU" dirty="0"/>
-              <a:t>Ионосфера</a:t>
-            </a:r>
-          </a:p>
-        </p:txBody>
-      </p:sp>
-      <p:sp>
-        <p:nvSpPr>
-          <p:cNvPr id="3" name="Объект 2">
-            <a:extLst>
-              <a:ext uri="{FF2B5EF4-FFF2-40B4-BE49-F238E27FC236}">
-                <a16:creationId xmlns:a16="http://schemas.microsoft.com/office/drawing/2014/main" id="{EA5DA5A0-E611-2CB3-334B-AEA8A3DA6D73}"/>
-              </a:ext>
-            </a:extLst>
-          </p:cNvPr>
-          <p:cNvSpPr>
-            <a:spLocks noGrp="1"/>
-          </p:cNvSpPr>
-          <p:nvPr>
-            <p:ph idx="1"/>
-          </p:nvPr>
-        </p:nvSpPr>
-        <p:spPr/>
-        <p:txBody>
-          <a:bodyPr/>
-          <a:lstStyle/>
-          <a:p>
-            <a:r>
-              <a:rPr lang="ru-RU" dirty="0"/>
-              <a:t>Что такое</a:t>
-            </a:r>
-          </a:p>
-          <a:p>
-            <a:r>
-              <a:rPr lang="ru-RU" dirty="0"/>
-              <a:t>Где находится</a:t>
-            </a:r>
-          </a:p>
-          <a:p>
-            <a:r>
-              <a:rPr lang="ru-RU" dirty="0"/>
-              <a:t>Ионные </a:t>
-            </a:r>
-            <a:r>
-              <a:rPr lang="ru-RU" dirty="0" err="1"/>
-              <a:t>газы</a:t>
-            </a:r>
-            <a:endParaRPr lang="ru-RU" dirty="0"/>
-          </a:p>
-          <a:p>
-            <a:r>
-              <a:rPr lang="ru-RU" dirty="0"/>
-              <a:t>Солнечная активность</a:t>
-            </a:r>
-          </a:p>
-          <a:p>
-            <a:pPr marL="0" indent="0">
-              <a:buNone/>
-            </a:pPr>
-            <a:endParaRPr lang="ru-RU" dirty="0"/>
-          </a:p>
-        </p:txBody>
-      </p:sp>
-      <p:pic>
-        <p:nvPicPr>
-          <p:cNvPr id="5" name="Рисунок 4">
-            <a:extLst>
-              <a:ext uri="{FF2B5EF4-FFF2-40B4-BE49-F238E27FC236}">
-                <a16:creationId xmlns:a16="http://schemas.microsoft.com/office/drawing/2014/main" id="{9EFFEC55-7DAA-9061-5256-5AED5359405B}"/>
-              </a:ext>
-            </a:extLst>
-          </p:cNvPr>
-          <p:cNvPicPr>
-            <a:picLocks noChangeAspect="1"/>
-          </p:cNvPicPr>
-          <p:nvPr/>
-        </p:nvPicPr>
-        <p:blipFill>
-          <a:blip r:embed="rId2">
-            <a:extLst>
-              <a:ext uri="{28A0092B-C50C-407E-A947-70E740481C1C}">
-                <a14:useLocalDpi xmlns:a14="http://schemas.microsoft.com/office/drawing/2010/main" val="0"/>
-              </a:ext>
-            </a:extLst>
-          </a:blip>
-          <a:stretch>
-            <a:fillRect/>
-          </a:stretch>
-        </p:blipFill>
-        <p:spPr>
-          <a:xfrm>
-            <a:off x="209556" y="4172332"/>
-            <a:ext cx="11772888" cy="2320543"/>
-          </a:xfrm>
-          <a:prstGeom prst="rect">
-            <a:avLst/>
-          </a:prstGeom>
-        </p:spPr>
-      </p:pic>
-    </p:spTree>
-    <p:extLst>
-      <p:ext uri="{BB962C8B-B14F-4D97-AF65-F5344CB8AC3E}">
-        <p14:creationId xmlns:p14="http://schemas.microsoft.com/office/powerpoint/2010/main" val="1194330264"/>
-      </p:ext>
-    </p:extLst>
-  </p:cSld>
-  <p:clrMapOvr>
-    <a:masterClrMapping/>
-  </p:clrMapOvr>
-</p:sld>
-</file>
-
-<file path=ppt/slides/slide6.xml><?xml version="1.0" encoding="utf-8"?>
-<p:sld xmlns:a="http://schemas.openxmlformats.org/drawingml/2006/main" xmlns:r="http://schemas.openxmlformats.org/officeDocument/2006/relationships" xmlns:p="http://schemas.openxmlformats.org/presentationml/2006/main">
-  <p:cSld>
-    <p:spTree>
-      <p:nvGrpSpPr>
-        <p:cNvPr id="1" name=""/>
-        <p:cNvGrpSpPr/>
-        <p:nvPr/>
-      </p:nvGrpSpPr>
-      <p:grpSpPr>
-        <a:xfrm>
-          <a:off x="0" y="0"/>
-          <a:ext cx="0" cy="0"/>
-          <a:chOff x="0" y="0"/>
-          <a:chExt cx="0" cy="0"/>
-        </a:xfrm>
-      </p:grpSpPr>
-      <p:sp>
-        <p:nvSpPr>
-          <p:cNvPr id="2" name="Заголовок 1">
-            <a:extLst>
-              <a:ext uri="{FF2B5EF4-FFF2-40B4-BE49-F238E27FC236}">
-                <a16:creationId xmlns:a16="http://schemas.microsoft.com/office/drawing/2014/main" id="{112DC8A5-97BD-23BE-6D49-D877EBFE9AD9}"/>
-              </a:ext>
-            </a:extLst>
-          </p:cNvPr>
-          <p:cNvSpPr>
-            <a:spLocks noGrp="1"/>
-          </p:cNvSpPr>
-          <p:nvPr>
-            <p:ph type="title"/>
-          </p:nvPr>
-        </p:nvSpPr>
-        <p:spPr/>
-        <p:txBody>
-          <a:bodyPr/>
-          <a:lstStyle/>
-          <a:p>
-            <a:r>
-              <a:rPr lang="ru-RU" dirty="0"/>
-              <a:t>Проблема ионосферной задержки</a:t>
-            </a:r>
-          </a:p>
-        </p:txBody>
-      </p:sp>
-      <p:sp>
-        <p:nvSpPr>
-          <p:cNvPr id="3" name="Объект 2">
-            <a:extLst>
-              <a:ext uri="{FF2B5EF4-FFF2-40B4-BE49-F238E27FC236}">
-                <a16:creationId xmlns:a16="http://schemas.microsoft.com/office/drawing/2014/main" id="{0E81E7C9-F91A-2BC1-017A-3E7CACCE47DA}"/>
-              </a:ext>
-            </a:extLst>
-          </p:cNvPr>
-          <p:cNvSpPr>
-            <a:spLocks noGrp="1"/>
-          </p:cNvSpPr>
-          <p:nvPr>
-            <p:ph idx="1"/>
-          </p:nvPr>
-        </p:nvSpPr>
-        <p:spPr/>
-        <p:txBody>
-          <a:bodyPr/>
-          <a:lstStyle/>
-          <a:p>
-            <a:r>
-              <a:rPr lang="ru-RU" dirty="0"/>
-              <a:t>Рекомбинация и электроны в ионосфере</a:t>
-            </a:r>
-          </a:p>
-          <a:p>
-            <a:r>
-              <a:rPr lang="ru-RU" dirty="0"/>
-              <a:t>Влияние на сигнал</a:t>
-            </a:r>
-          </a:p>
-          <a:p>
-            <a:endParaRPr lang="ru-RU" dirty="0"/>
-          </a:p>
-        </p:txBody>
-      </p:sp>
-      <p:pic>
-        <p:nvPicPr>
-          <p:cNvPr id="5" name="Рисунок 4">
-            <a:extLst>
-              <a:ext uri="{FF2B5EF4-FFF2-40B4-BE49-F238E27FC236}">
-                <a16:creationId xmlns:a16="http://schemas.microsoft.com/office/drawing/2014/main" id="{093521F4-03AA-7E12-4D46-766DB5A07928}"/>
-              </a:ext>
-            </a:extLst>
-          </p:cNvPr>
-          <p:cNvPicPr>
-            <a:picLocks noChangeAspect="1"/>
-          </p:cNvPicPr>
-          <p:nvPr/>
-        </p:nvPicPr>
-        <p:blipFill>
-          <a:blip r:embed="rId2"/>
-          <a:stretch>
-            <a:fillRect/>
-          </a:stretch>
-        </p:blipFill>
-        <p:spPr>
-          <a:xfrm>
-            <a:off x="838200" y="3362408"/>
-            <a:ext cx="3046200" cy="1319372"/>
-          </a:xfrm>
-          <a:prstGeom prst="rect">
-            <a:avLst/>
-          </a:prstGeom>
-        </p:spPr>
-      </p:pic>
-      <p:pic>
-        <p:nvPicPr>
-          <p:cNvPr id="7" name="Рисунок 6">
-            <a:extLst>
-              <a:ext uri="{FF2B5EF4-FFF2-40B4-BE49-F238E27FC236}">
-                <a16:creationId xmlns:a16="http://schemas.microsoft.com/office/drawing/2014/main" id="{391B4A6F-7973-C15E-5AFF-60A2EAB6A525}"/>
-              </a:ext>
-            </a:extLst>
-          </p:cNvPr>
-          <p:cNvPicPr>
-            <a:picLocks noChangeAspect="1"/>
-          </p:cNvPicPr>
-          <p:nvPr/>
-        </p:nvPicPr>
-        <p:blipFill>
-          <a:blip r:embed="rId3"/>
-          <a:stretch>
-            <a:fillRect/>
-          </a:stretch>
-        </p:blipFill>
-        <p:spPr>
-          <a:xfrm>
-            <a:off x="4918543" y="3107567"/>
-            <a:ext cx="6249272" cy="1829055"/>
-          </a:xfrm>
-          <a:prstGeom prst="rect">
-            <a:avLst/>
-          </a:prstGeom>
-        </p:spPr>
-      </p:pic>
-    </p:spTree>
-    <p:extLst>
-      <p:ext uri="{BB962C8B-B14F-4D97-AF65-F5344CB8AC3E}">
-        <p14:creationId xmlns:p14="http://schemas.microsoft.com/office/powerpoint/2010/main" val="709186554"/>
-      </p:ext>
-    </p:extLst>
-  </p:cSld>
-  <p:clrMapOvr>
-    <a:masterClrMapping/>
-  </p:clrMapOvr>
-</p:sld>
-</file>
-
-<file path=ppt/slides/slide7.xml><?xml version="1.0" encoding="utf-8"?>
-<p:sld xmlns:a="http://schemas.openxmlformats.org/drawingml/2006/main" xmlns:r="http://schemas.openxmlformats.org/officeDocument/2006/relationships" xmlns:p="http://schemas.openxmlformats.org/presentationml/2006/main">
-  <p:cSld>
-    <p:spTree>
-      <p:nvGrpSpPr>
-        <p:cNvPr id="1" name=""/>
-        <p:cNvGrpSpPr/>
-        <p:nvPr/>
-      </p:nvGrpSpPr>
-      <p:grpSpPr>
-        <a:xfrm>
-          <a:off x="0" y="0"/>
-          <a:ext cx="0" cy="0"/>
-          <a:chOff x="0" y="0"/>
-          <a:chExt cx="0" cy="0"/>
-        </a:xfrm>
-      </p:grpSpPr>
-      <p:sp>
-        <p:nvSpPr>
-          <p:cNvPr id="2" name="Заголовок 1">
-            <a:extLst>
-              <a:ext uri="{FF2B5EF4-FFF2-40B4-BE49-F238E27FC236}">
-                <a16:creationId xmlns:a16="http://schemas.microsoft.com/office/drawing/2014/main" id="{D1D54833-88C0-ED91-B02F-B643B14711B9}"/>
-              </a:ext>
-            </a:extLst>
-          </p:cNvPr>
-          <p:cNvSpPr>
-            <a:spLocks noGrp="1"/>
-          </p:cNvSpPr>
-          <p:nvPr>
-            <p:ph type="title"/>
-          </p:nvPr>
-        </p:nvSpPr>
-        <p:spPr/>
-        <p:txBody>
-          <a:bodyPr/>
-          <a:lstStyle/>
-          <a:p>
-            <a:r>
-              <a:rPr lang="en-US" dirty="0" err="1"/>
-              <a:t>NeQuick</a:t>
-            </a:r>
-            <a:endParaRPr lang="ru-RU" dirty="0"/>
-          </a:p>
-        </p:txBody>
-      </p:sp>
-      <p:sp>
-        <p:nvSpPr>
-          <p:cNvPr id="3" name="Объект 2">
-            <a:extLst>
-              <a:ext uri="{FF2B5EF4-FFF2-40B4-BE49-F238E27FC236}">
-                <a16:creationId xmlns:a16="http://schemas.microsoft.com/office/drawing/2014/main" id="{CF0F8239-1FA8-CA85-27E1-FB68BB683D22}"/>
-              </a:ext>
-            </a:extLst>
-          </p:cNvPr>
-          <p:cNvSpPr>
-            <a:spLocks noGrp="1"/>
-          </p:cNvSpPr>
-          <p:nvPr>
-            <p:ph idx="1"/>
-          </p:nvPr>
-        </p:nvSpPr>
-        <p:spPr/>
-        <p:txBody>
-          <a:bodyPr/>
-          <a:lstStyle/>
-          <a:p>
-            <a:r>
-              <a:rPr lang="ru-RU" dirty="0"/>
-              <a:t>Что такое</a:t>
-            </a:r>
-          </a:p>
-          <a:p>
-            <a:r>
-              <a:rPr lang="ru-RU" dirty="0"/>
-              <a:t>Зачем нужен</a:t>
-            </a:r>
-          </a:p>
-          <a:p>
-            <a:r>
-              <a:rPr lang="ru-RU" dirty="0"/>
-              <a:t>Где может быть использован</a:t>
-            </a:r>
-          </a:p>
-          <a:p>
-            <a:endParaRPr lang="ru-RU" dirty="0"/>
-          </a:p>
-        </p:txBody>
-      </p:sp>
-      <p:pic>
-        <p:nvPicPr>
-          <p:cNvPr id="5" name="Рисунок 4">
-            <a:extLst>
-              <a:ext uri="{FF2B5EF4-FFF2-40B4-BE49-F238E27FC236}">
-                <a16:creationId xmlns:a16="http://schemas.microsoft.com/office/drawing/2014/main" id="{AFAF70B3-43A7-A052-6E20-44B22D90DFEA}"/>
-              </a:ext>
-            </a:extLst>
-          </p:cNvPr>
-          <p:cNvPicPr>
-            <a:picLocks noChangeAspect="1"/>
-          </p:cNvPicPr>
-          <p:nvPr/>
-        </p:nvPicPr>
-        <p:blipFill>
-          <a:blip r:embed="rId2"/>
-          <a:stretch>
-            <a:fillRect/>
-          </a:stretch>
-        </p:blipFill>
-        <p:spPr>
-          <a:xfrm>
-            <a:off x="5917871" y="1275488"/>
-            <a:ext cx="4538848" cy="4307024"/>
-          </a:xfrm>
-          <a:prstGeom prst="rect">
-            <a:avLst/>
-          </a:prstGeom>
-        </p:spPr>
-      </p:pic>
-    </p:spTree>
-    <p:extLst>
-      <p:ext uri="{BB962C8B-B14F-4D97-AF65-F5344CB8AC3E}">
-        <p14:creationId xmlns:p14="http://schemas.microsoft.com/office/powerpoint/2010/main" val="1651913881"/>
-      </p:ext>
-    </p:extLst>
-  </p:cSld>
-  <p:clrMapOvr>
-    <a:masterClrMapping/>
-  </p:clrMapOvr>
-</p:sld>
-</file>
-
 <file path=ppt/slides/slide8.xml><?xml version="1.0" encoding="utf-8"?>
 <p:sld xmlns:a="http://schemas.openxmlformats.org/drawingml/2006/main" xmlns:r="http://schemas.openxmlformats.org/officeDocument/2006/relationships" xmlns:p="http://schemas.openxmlformats.org/presentationml/2006/main">
   <p:cSld>
@@ -4982,7 +4801,7 @@
           <p:cNvPr id="2" name="Заголовок 1">
             <a:extLst>
               <a:ext uri="{FF2B5EF4-FFF2-40B4-BE49-F238E27FC236}">
-                <a16:creationId xmlns:a16="http://schemas.microsoft.com/office/drawing/2014/main" id="{5648EE8D-DD65-250F-5633-D6DA654FA463}"/>
+                <a16:creationId xmlns:a16="http://schemas.microsoft.com/office/drawing/2014/main" id="{26FD2397-334B-3912-A838-243FC2C763E8}"/>
               </a:ext>
             </a:extLst>
           </p:cNvPr>
@@ -5000,7 +4819,7 @@
           <a:p>
             <a:r>
               <a:rPr lang="ru-RU" dirty="0"/>
-              <a:t>Установка</a:t>
+              <a:t>Анализ результатов</a:t>
             </a:r>
           </a:p>
         </p:txBody>
@@ -5010,7 +4829,7 @@
           <p:cNvPr id="3" name="Объект 2">
             <a:extLst>
               <a:ext uri="{FF2B5EF4-FFF2-40B4-BE49-F238E27FC236}">
-                <a16:creationId xmlns:a16="http://schemas.microsoft.com/office/drawing/2014/main" id="{1790EB9C-AE87-B437-45B9-40AD6DF25F84}"/>
+                <a16:creationId xmlns:a16="http://schemas.microsoft.com/office/drawing/2014/main" id="{D34ECAEF-181D-ACB0-8976-B28C702325E0}"/>
               </a:ext>
             </a:extLst>
           </p:cNvPr>
@@ -5021,26 +4840,39 @@
             <p:ph idx="1"/>
           </p:nvPr>
         </p:nvSpPr>
-        <p:spPr/>
-        <p:txBody>
-          <a:bodyPr/>
-          <a:lstStyle/>
-          <a:p>
-            <a:r>
-              <a:rPr lang="ru-RU" dirty="0"/>
-              <a:t>Где скачать</a:t>
-            </a:r>
-          </a:p>
-          <a:p>
-            <a:r>
-              <a:rPr lang="ru-RU" dirty="0"/>
-              <a:t>Что нужно</a:t>
-            </a:r>
-          </a:p>
-          <a:p>
-            <a:r>
-              <a:rPr lang="ru-RU" dirty="0"/>
-              <a:t>Как собрать и запустить</a:t>
+        <p:spPr>
+          <a:xfrm>
+            <a:off x="472843" y="5992525"/>
+            <a:ext cx="10515600" cy="640050"/>
+          </a:xfrm>
+        </p:spPr>
+        <p:txBody>
+          <a:bodyPr/>
+          <a:lstStyle/>
+          <a:p>
+            <a:pPr marL="0" indent="0" algn="ctr">
+              <a:buNone/>
+            </a:pPr>
+            <a:r>
+              <a:rPr lang="ru-RU" dirty="0">
+                <a:latin typeface="Times New Roman" panose="02020603050405020304" pitchFamily="18" charset="0"/>
+                <a:cs typeface="Times New Roman" panose="02020603050405020304" pitchFamily="18" charset="0"/>
+              </a:rPr>
+              <a:t>Станция </a:t>
+            </a:r>
+            <a:r>
+              <a:rPr lang="en-US" dirty="0">
+                <a:latin typeface="Times New Roman" panose="02020603050405020304" pitchFamily="18" charset="0"/>
+                <a:cs typeface="Times New Roman" panose="02020603050405020304" pitchFamily="18" charset="0"/>
+              </a:rPr>
+              <a:t>CHIPI00BRA, </a:t>
+            </a:r>
+            <a:r>
+              <a:rPr lang="ru-RU" dirty="0">
+                <a:latin typeface="Times New Roman" panose="02020603050405020304" pitchFamily="18" charset="0"/>
+                <a:cs typeface="Times New Roman" panose="02020603050405020304" pitchFamily="18" charset="0"/>
+              </a:rPr>
+              <a:t>Сан-Паулу, Бразилия (-22,7, -45)</a:t>
             </a:r>
           </a:p>
         </p:txBody>
@@ -5050,7 +4882,7 @@
           <p:cNvPr id="5" name="Рисунок 4">
             <a:extLst>
               <a:ext uri="{FF2B5EF4-FFF2-40B4-BE49-F238E27FC236}">
-                <a16:creationId xmlns:a16="http://schemas.microsoft.com/office/drawing/2014/main" id="{4E419DA9-541E-30A9-9ED9-13662EF08FF3}"/>
+                <a16:creationId xmlns:a16="http://schemas.microsoft.com/office/drawing/2014/main" id="{BB0C930D-585F-7284-F74A-D5F9A8C76C44}"/>
               </a:ext>
             </a:extLst>
           </p:cNvPr>
@@ -5067,8 +4899,8 @@
         </p:blipFill>
         <p:spPr>
           <a:xfrm>
-            <a:off x="2513515" y="1538738"/>
-            <a:ext cx="9326277" cy="4925112"/>
+            <a:off x="1525979" y="1690688"/>
+            <a:ext cx="8409329" cy="4301837"/>
           </a:xfrm>
           <a:prstGeom prst="rect">
             <a:avLst/>
@@ -5078,7 +4910,7 @@
     </p:spTree>
     <p:extLst>
       <p:ext uri="{BB962C8B-B14F-4D97-AF65-F5344CB8AC3E}">
-        <p14:creationId xmlns:p14="http://schemas.microsoft.com/office/powerpoint/2010/main" val="4023836096"/>
+        <p14:creationId xmlns:p14="http://schemas.microsoft.com/office/powerpoint/2010/main" val="1832665835"/>
       </p:ext>
     </p:extLst>
   </p:cSld>
@@ -5110,7 +4942,7 @@
           <p:cNvPr id="2" name="Заголовок 1">
             <a:extLst>
               <a:ext uri="{FF2B5EF4-FFF2-40B4-BE49-F238E27FC236}">
-                <a16:creationId xmlns:a16="http://schemas.microsoft.com/office/drawing/2014/main" id="{6C147EBB-2A9B-9C5C-4C91-7B5F13CC1A64}"/>
+                <a16:creationId xmlns:a16="http://schemas.microsoft.com/office/drawing/2014/main" id="{671026CD-5492-C48B-2FFD-4DAE39D864AA}"/>
               </a:ext>
             </a:extLst>
           </p:cNvPr>
@@ -5128,69 +4960,52 @@
           <a:p>
             <a:r>
               <a:rPr lang="ru-RU" dirty="0"/>
-              <a:t>Использование</a:t>
-            </a:r>
-          </a:p>
-        </p:txBody>
-      </p:sp>
-      <p:sp>
-        <p:nvSpPr>
-          <p:cNvPr id="3" name="Объект 2">
-            <a:extLst>
-              <a:ext uri="{FF2B5EF4-FFF2-40B4-BE49-F238E27FC236}">
-                <a16:creationId xmlns:a16="http://schemas.microsoft.com/office/drawing/2014/main" id="{F3ED66E7-592D-2FB6-E36A-7492621AE0BA}"/>
-              </a:ext>
-            </a:extLst>
-          </p:cNvPr>
-          <p:cNvSpPr>
-            <a:spLocks noGrp="1"/>
-          </p:cNvSpPr>
-          <p:nvPr>
-            <p:ph idx="1"/>
-          </p:nvPr>
-        </p:nvSpPr>
-        <p:spPr/>
-        <p:txBody>
-          <a:bodyPr/>
-          <a:lstStyle/>
-          <a:p>
-            <a:r>
-              <a:rPr lang="ru-RU" dirty="0"/>
-              <a:t>Какие данные нужны</a:t>
-            </a:r>
-          </a:p>
-          <a:p>
-            <a:r>
-              <a:rPr lang="ru-RU" dirty="0"/>
-              <a:t>Откуда их достать</a:t>
-            </a:r>
-          </a:p>
-          <a:p>
-            <a:r>
-              <a:rPr lang="ru-RU" dirty="0"/>
-              <a:t>Что нужно для входных данных</a:t>
-            </a:r>
-          </a:p>
-          <a:p>
-            <a:r>
-              <a:rPr lang="ru-RU" dirty="0"/>
-              <a:t>Что нужно для подготовки входных данных</a:t>
-            </a:r>
-          </a:p>
-          <a:p>
-            <a:r>
-              <a:rPr lang="ru-RU" dirty="0"/>
-              <a:t>Что получается на выходе</a:t>
+              <a:t>Анализ результатов</a:t>
             </a:r>
           </a:p>
         </p:txBody>
       </p:sp>
       <p:pic>
         <p:nvPicPr>
-          <p:cNvPr id="6" name="Рисунок 5">
-            <a:extLst>
-              <a:ext uri="{FF2B5EF4-FFF2-40B4-BE49-F238E27FC236}">
-                <a16:creationId xmlns:a16="http://schemas.microsoft.com/office/drawing/2014/main" id="{AEE323C6-8EC2-6E4A-0C03-C35AFD1B6AF5}"/>
+          <p:cNvPr id="9" name="Объект 8">
+            <a:extLst>
+              <a:ext uri="{FF2B5EF4-FFF2-40B4-BE49-F238E27FC236}">
+                <a16:creationId xmlns:a16="http://schemas.microsoft.com/office/drawing/2014/main" id="{4F10C67E-F109-4C47-8926-80B1E78C9B4A}"/>
+              </a:ext>
+            </a:extLst>
+          </p:cNvPr>
+          <p:cNvPicPr>
+            <a:picLocks noGrp="1" noChangeAspect="1"/>
+          </p:cNvPicPr>
+          <p:nvPr>
+            <p:ph idx="1"/>
+          </p:nvPr>
+        </p:nvPicPr>
+        <p:blipFill>
+          <a:blip r:embed="rId2">
+            <a:extLst>
+              <a:ext uri="{28A0092B-C50C-407E-A947-70E740481C1C}">
+                <a14:useLocalDpi xmlns:a14="http://schemas.microsoft.com/office/drawing/2010/main" val="0"/>
+              </a:ext>
+            </a:extLst>
+          </a:blip>
+          <a:stretch>
+            <a:fillRect/>
+          </a:stretch>
+        </p:blipFill>
+        <p:spPr>
+          <a:xfrm>
+            <a:off x="700572" y="1592421"/>
+            <a:ext cx="5395428" cy="3673158"/>
+          </a:xfrm>
+        </p:spPr>
+      </p:pic>
+      <p:pic>
+        <p:nvPicPr>
+          <p:cNvPr id="13" name="Рисунок 12">
+            <a:extLst>
+              <a:ext uri="{FF2B5EF4-FFF2-40B4-BE49-F238E27FC236}">
+                <a16:creationId xmlns:a16="http://schemas.microsoft.com/office/drawing/2014/main" id="{9B7A1E1E-B2AA-F0F8-C6D4-CABFD2720D57}"/>
               </a:ext>
             </a:extLst>
           </p:cNvPr>
@@ -5200,15 +5015,21 @@
           <p:nvPr/>
         </p:nvPicPr>
         <p:blipFill>
-          <a:blip r:embed="rId2"/>
+          <a:blip r:embed="rId3">
+            <a:extLst>
+              <a:ext uri="{28A0092B-C50C-407E-A947-70E740481C1C}">
+                <a14:useLocalDpi xmlns:a14="http://schemas.microsoft.com/office/drawing/2010/main" val="0"/>
+              </a:ext>
+            </a:extLst>
+          </a:blip>
           <a:stretch>
             <a:fillRect/>
           </a:stretch>
         </p:blipFill>
         <p:spPr>
           <a:xfrm>
-            <a:off x="1687780" y="2110031"/>
-            <a:ext cx="8816439" cy="3782525"/>
+            <a:off x="6096000" y="2259386"/>
+            <a:ext cx="5993914" cy="2339228"/>
           </a:xfrm>
           <a:prstGeom prst="rect">
             <a:avLst/>
@@ -5218,7 +5039,7 @@
     </p:spTree>
     <p:extLst>
       <p:ext uri="{BB962C8B-B14F-4D97-AF65-F5344CB8AC3E}">
-        <p14:creationId xmlns:p14="http://schemas.microsoft.com/office/powerpoint/2010/main" val="3606665906"/>
+        <p14:creationId xmlns:p14="http://schemas.microsoft.com/office/powerpoint/2010/main" val="1641986736"/>
       </p:ext>
     </p:extLst>
   </p:cSld>

</xml_diff>

<commit_message>
report + data gathering
</commit_message>
<xml_diff>
--- a/Исследование алгоритма вычисления ионосферной поправки для системы Galileo.pptx
+++ b/Исследование алгоритма вычисления ионосферной поправки для системы Galileo.pptx
@@ -272,7 +272,7 @@
           <a:p>
             <a:fld id="{B3F3D847-F5A2-4318-AFDA-B92EAB6C0036}" type="datetimeFigureOut">
               <a:rPr lang="ru-RU" smtClean="0"/>
-              <a:t>16.06.2022</a:t>
+              <a:t>23.06.2022</a:t>
             </a:fld>
             <a:endParaRPr lang="ru-RU"/>
           </a:p>
@@ -470,7 +470,7 @@
           <a:p>
             <a:fld id="{B3F3D847-F5A2-4318-AFDA-B92EAB6C0036}" type="datetimeFigureOut">
               <a:rPr lang="ru-RU" smtClean="0"/>
-              <a:t>16.06.2022</a:t>
+              <a:t>23.06.2022</a:t>
             </a:fld>
             <a:endParaRPr lang="ru-RU"/>
           </a:p>
@@ -678,7 +678,7 @@
           <a:p>
             <a:fld id="{B3F3D847-F5A2-4318-AFDA-B92EAB6C0036}" type="datetimeFigureOut">
               <a:rPr lang="ru-RU" smtClean="0"/>
-              <a:t>16.06.2022</a:t>
+              <a:t>23.06.2022</a:t>
             </a:fld>
             <a:endParaRPr lang="ru-RU"/>
           </a:p>
@@ -876,7 +876,7 @@
           <a:p>
             <a:fld id="{B3F3D847-F5A2-4318-AFDA-B92EAB6C0036}" type="datetimeFigureOut">
               <a:rPr lang="ru-RU" smtClean="0"/>
-              <a:t>16.06.2022</a:t>
+              <a:t>23.06.2022</a:t>
             </a:fld>
             <a:endParaRPr lang="ru-RU"/>
           </a:p>
@@ -1151,7 +1151,7 @@
           <a:p>
             <a:fld id="{B3F3D847-F5A2-4318-AFDA-B92EAB6C0036}" type="datetimeFigureOut">
               <a:rPr lang="ru-RU" smtClean="0"/>
-              <a:t>16.06.2022</a:t>
+              <a:t>23.06.2022</a:t>
             </a:fld>
             <a:endParaRPr lang="ru-RU"/>
           </a:p>
@@ -1416,7 +1416,7 @@
           <a:p>
             <a:fld id="{B3F3D847-F5A2-4318-AFDA-B92EAB6C0036}" type="datetimeFigureOut">
               <a:rPr lang="ru-RU" smtClean="0"/>
-              <a:t>16.06.2022</a:t>
+              <a:t>23.06.2022</a:t>
             </a:fld>
             <a:endParaRPr lang="ru-RU"/>
           </a:p>
@@ -1828,7 +1828,7 @@
           <a:p>
             <a:fld id="{B3F3D847-F5A2-4318-AFDA-B92EAB6C0036}" type="datetimeFigureOut">
               <a:rPr lang="ru-RU" smtClean="0"/>
-              <a:t>16.06.2022</a:t>
+              <a:t>23.06.2022</a:t>
             </a:fld>
             <a:endParaRPr lang="ru-RU"/>
           </a:p>
@@ -1969,7 +1969,7 @@
           <a:p>
             <a:fld id="{B3F3D847-F5A2-4318-AFDA-B92EAB6C0036}" type="datetimeFigureOut">
               <a:rPr lang="ru-RU" smtClean="0"/>
-              <a:t>16.06.2022</a:t>
+              <a:t>23.06.2022</a:t>
             </a:fld>
             <a:endParaRPr lang="ru-RU"/>
           </a:p>
@@ -2082,7 +2082,7 @@
           <a:p>
             <a:fld id="{B3F3D847-F5A2-4318-AFDA-B92EAB6C0036}" type="datetimeFigureOut">
               <a:rPr lang="ru-RU" smtClean="0"/>
-              <a:t>16.06.2022</a:t>
+              <a:t>23.06.2022</a:t>
             </a:fld>
             <a:endParaRPr lang="ru-RU"/>
           </a:p>
@@ -2393,7 +2393,7 @@
           <a:p>
             <a:fld id="{B3F3D847-F5A2-4318-AFDA-B92EAB6C0036}" type="datetimeFigureOut">
               <a:rPr lang="ru-RU" smtClean="0"/>
-              <a:t>16.06.2022</a:t>
+              <a:t>23.06.2022</a:t>
             </a:fld>
             <a:endParaRPr lang="ru-RU"/>
           </a:p>
@@ -2681,7 +2681,7 @@
           <a:p>
             <a:fld id="{B3F3D847-F5A2-4318-AFDA-B92EAB6C0036}" type="datetimeFigureOut">
               <a:rPr lang="ru-RU" smtClean="0"/>
-              <a:t>16.06.2022</a:t>
+              <a:t>23.06.2022</a:t>
             </a:fld>
             <a:endParaRPr lang="ru-RU"/>
           </a:p>
@@ -2922,7 +2922,7 @@
           <a:p>
             <a:fld id="{B3F3D847-F5A2-4318-AFDA-B92EAB6C0036}" type="datetimeFigureOut">
               <a:rPr lang="ru-RU" smtClean="0"/>
-              <a:t>16.06.2022</a:t>
+              <a:t>23.06.2022</a:t>
             </a:fld>
             <a:endParaRPr lang="ru-RU"/>
           </a:p>
@@ -3576,7 +3576,7 @@
         </p:blipFill>
         <p:spPr>
           <a:xfrm>
-            <a:off x="1472711" y="1690688"/>
+            <a:off x="1472711" y="1699480"/>
             <a:ext cx="9246577" cy="4800256"/>
           </a:xfrm>
           <a:prstGeom prst="rect">

</xml_diff>